<commit_message>
Week 14 Homework- MadCap Flare Script- Julio Madrid
</commit_message>
<xml_diff>
--- a/Week04-Tours/Homework/Week 4 Homework-IMDb Tour-Julio Madrid 3.0.pptx
+++ b/Week04-Tours/Homework/Week 4 Homework-IMDb Tour-Julio Madrid 3.0.pptx
@@ -2,7 +2,7 @@
 <file path=ppt/presentation.xml><?xml version="1.0" encoding="utf-8"?>
 <p:presentation xmlns:a="http://schemas.openxmlformats.org/drawingml/2006/main" xmlns:r="http://schemas.openxmlformats.org/officeDocument/2006/relationships" xmlns:p="http://schemas.openxmlformats.org/presentationml/2006/main" saveSubsetFonts="1">
   <p:sldMasterIdLst>
-    <p:sldMasterId id="2147483648" r:id="rId1"/>
+    <p:sldMasterId id="2147483660" r:id="rId1"/>
   </p:sldMasterIdLst>
   <p:sldIdLst>
     <p:sldId id="256" r:id="rId2"/>
@@ -17,7 +17,7 @@
     <a:defPPr>
       <a:defRPr lang="en-US"/>
     </a:defPPr>
-    <a:lvl1pPr marL="0" algn="l" defTabSz="914400" rtl="0" eaLnBrk="1" latinLnBrk="0" hangingPunct="1">
+    <a:lvl1pPr marL="0" algn="l" defTabSz="457200" rtl="0" eaLnBrk="1" latinLnBrk="0" hangingPunct="1">
       <a:defRPr sz="1800" kern="1200">
         <a:solidFill>
           <a:schemeClr val="tx1"/>
@@ -27,7 +27,7 @@
         <a:cs typeface="+mn-cs"/>
       </a:defRPr>
     </a:lvl1pPr>
-    <a:lvl2pPr marL="457200" algn="l" defTabSz="914400" rtl="0" eaLnBrk="1" latinLnBrk="0" hangingPunct="1">
+    <a:lvl2pPr marL="457200" algn="l" defTabSz="457200" rtl="0" eaLnBrk="1" latinLnBrk="0" hangingPunct="1">
       <a:defRPr sz="1800" kern="1200">
         <a:solidFill>
           <a:schemeClr val="tx1"/>
@@ -37,7 +37,7 @@
         <a:cs typeface="+mn-cs"/>
       </a:defRPr>
     </a:lvl2pPr>
-    <a:lvl3pPr marL="914400" algn="l" defTabSz="914400" rtl="0" eaLnBrk="1" latinLnBrk="0" hangingPunct="1">
+    <a:lvl3pPr marL="914400" algn="l" defTabSz="457200" rtl="0" eaLnBrk="1" latinLnBrk="0" hangingPunct="1">
       <a:defRPr sz="1800" kern="1200">
         <a:solidFill>
           <a:schemeClr val="tx1"/>
@@ -47,7 +47,7 @@
         <a:cs typeface="+mn-cs"/>
       </a:defRPr>
     </a:lvl3pPr>
-    <a:lvl4pPr marL="1371600" algn="l" defTabSz="914400" rtl="0" eaLnBrk="1" latinLnBrk="0" hangingPunct="1">
+    <a:lvl4pPr marL="1371600" algn="l" defTabSz="457200" rtl="0" eaLnBrk="1" latinLnBrk="0" hangingPunct="1">
       <a:defRPr sz="1800" kern="1200">
         <a:solidFill>
           <a:schemeClr val="tx1"/>
@@ -57,7 +57,7 @@
         <a:cs typeface="+mn-cs"/>
       </a:defRPr>
     </a:lvl4pPr>
-    <a:lvl5pPr marL="1828800" algn="l" defTabSz="914400" rtl="0" eaLnBrk="1" latinLnBrk="0" hangingPunct="1">
+    <a:lvl5pPr marL="1828800" algn="l" defTabSz="457200" rtl="0" eaLnBrk="1" latinLnBrk="0" hangingPunct="1">
       <a:defRPr sz="1800" kern="1200">
         <a:solidFill>
           <a:schemeClr val="tx1"/>
@@ -67,7 +67,7 @@
         <a:cs typeface="+mn-cs"/>
       </a:defRPr>
     </a:lvl5pPr>
-    <a:lvl6pPr marL="2286000" algn="l" defTabSz="914400" rtl="0" eaLnBrk="1" latinLnBrk="0" hangingPunct="1">
+    <a:lvl6pPr marL="2286000" algn="l" defTabSz="457200" rtl="0" eaLnBrk="1" latinLnBrk="0" hangingPunct="1">
       <a:defRPr sz="1800" kern="1200">
         <a:solidFill>
           <a:schemeClr val="tx1"/>
@@ -77,7 +77,7 @@
         <a:cs typeface="+mn-cs"/>
       </a:defRPr>
     </a:lvl6pPr>
-    <a:lvl7pPr marL="2743200" algn="l" defTabSz="914400" rtl="0" eaLnBrk="1" latinLnBrk="0" hangingPunct="1">
+    <a:lvl7pPr marL="2743200" algn="l" defTabSz="457200" rtl="0" eaLnBrk="1" latinLnBrk="0" hangingPunct="1">
       <a:defRPr sz="1800" kern="1200">
         <a:solidFill>
           <a:schemeClr val="tx1"/>
@@ -87,7 +87,7 @@
         <a:cs typeface="+mn-cs"/>
       </a:defRPr>
     </a:lvl7pPr>
-    <a:lvl8pPr marL="3200400" algn="l" defTabSz="914400" rtl="0" eaLnBrk="1" latinLnBrk="0" hangingPunct="1">
+    <a:lvl8pPr marL="3200400" algn="l" defTabSz="457200" rtl="0" eaLnBrk="1" latinLnBrk="0" hangingPunct="1">
       <a:defRPr sz="1800" kern="1200">
         <a:solidFill>
           <a:schemeClr val="tx1"/>
@@ -97,7 +97,7 @@
         <a:cs typeface="+mn-cs"/>
       </a:defRPr>
     </a:lvl8pPr>
-    <a:lvl9pPr marL="3657600" algn="l" defTabSz="914400" rtl="0" eaLnBrk="1" latinLnBrk="0" hangingPunct="1">
+    <a:lvl9pPr marL="3657600" algn="l" defTabSz="457200" rtl="0" eaLnBrk="1" latinLnBrk="0" hangingPunct="1">
       <a:defRPr sz="1800" kern="1200">
         <a:solidFill>
           <a:schemeClr val="tx1"/>
@@ -135,13 +135,7 @@
       </p:grpSpPr>
       <p:sp>
         <p:nvSpPr>
-          <p:cNvPr id="2" name="Title 1">
-            <a:extLst>
-              <a:ext uri="{FF2B5EF4-FFF2-40B4-BE49-F238E27FC236}">
-                <a16:creationId xmlns:a16="http://schemas.microsoft.com/office/drawing/2014/main" id="{A75C9CBD-3287-48AF-A759-297B00F41B59}"/>
-              </a:ext>
-            </a:extLst>
-          </p:cNvPr>
+          <p:cNvPr id="2" name="Title 1"/>
           <p:cNvSpPr>
             <a:spLocks noGrp="1"/>
           </p:cNvSpPr>
@@ -167,18 +161,13 @@
               <a:rPr lang="en-US"/>
               <a:t>Click to edit Master title style</a:t>
             </a:r>
-          </a:p>
-        </p:txBody>
-      </p:sp>
-      <p:sp>
-        <p:nvSpPr>
-          <p:cNvPr id="3" name="Subtitle 2">
-            <a:extLst>
-              <a:ext uri="{FF2B5EF4-FFF2-40B4-BE49-F238E27FC236}">
-                <a16:creationId xmlns:a16="http://schemas.microsoft.com/office/drawing/2014/main" id="{F3A1806C-A13F-41B2-B2BD-ACBAA939FFF6}"/>
-              </a:ext>
-            </a:extLst>
-          </p:cNvPr>
+            <a:endParaRPr lang="en-US" dirty="0"/>
+          </a:p>
+        </p:txBody>
+      </p:sp>
+      <p:sp>
+        <p:nvSpPr>
+          <p:cNvPr id="3" name="Subtitle 2"/>
           <p:cNvSpPr>
             <a:spLocks noGrp="1"/>
           </p:cNvSpPr>
@@ -237,18 +226,13 @@
               <a:rPr lang="en-US"/>
               <a:t>Click to edit Master subtitle style</a:t>
             </a:r>
-          </a:p>
-        </p:txBody>
-      </p:sp>
-      <p:sp>
-        <p:nvSpPr>
-          <p:cNvPr id="4" name="Date Placeholder 3">
-            <a:extLst>
-              <a:ext uri="{FF2B5EF4-FFF2-40B4-BE49-F238E27FC236}">
-                <a16:creationId xmlns:a16="http://schemas.microsoft.com/office/drawing/2014/main" id="{DEF18ADC-5E84-4C54-9A37-65B8895D6C6F}"/>
-              </a:ext>
-            </a:extLst>
-          </p:cNvPr>
+            <a:endParaRPr lang="en-US" dirty="0"/>
+          </a:p>
+        </p:txBody>
+      </p:sp>
+      <p:sp>
+        <p:nvSpPr>
+          <p:cNvPr id="4" name="Date Placeholder 3"/>
           <p:cNvSpPr>
             <a:spLocks noGrp="1"/>
           </p:cNvSpPr>
@@ -263,7 +247,7 @@
           <a:p>
             <a:fld id="{30450916-ED6A-46E3-AB56-D21E556239AF}" type="datetimeFigureOut">
               <a:rPr lang="en-US" smtClean="0"/>
-              <a:t>3/17/2022</a:t>
+              <a:t>5/15/2022</a:t>
             </a:fld>
             <a:endParaRPr lang="en-US"/>
           </a:p>
@@ -271,13 +255,7 @@
       </p:sp>
       <p:sp>
         <p:nvSpPr>
-          <p:cNvPr id="5" name="Footer Placeholder 4">
-            <a:extLst>
-              <a:ext uri="{FF2B5EF4-FFF2-40B4-BE49-F238E27FC236}">
-                <a16:creationId xmlns:a16="http://schemas.microsoft.com/office/drawing/2014/main" id="{4F1DFD2F-4833-40F9-B813-A1265A4050B2}"/>
-              </a:ext>
-            </a:extLst>
-          </p:cNvPr>
+          <p:cNvPr id="5" name="Footer Placeholder 4"/>
           <p:cNvSpPr>
             <a:spLocks noGrp="1"/>
           </p:cNvSpPr>
@@ -296,13 +274,7 @@
       </p:sp>
       <p:sp>
         <p:nvSpPr>
-          <p:cNvPr id="6" name="Slide Number Placeholder 5">
-            <a:extLst>
-              <a:ext uri="{FF2B5EF4-FFF2-40B4-BE49-F238E27FC236}">
-                <a16:creationId xmlns:a16="http://schemas.microsoft.com/office/drawing/2014/main" id="{1AE42268-E20C-4729-BF07-C3CE6AE2A022}"/>
-              </a:ext>
-            </a:extLst>
-          </p:cNvPr>
+          <p:cNvPr id="6" name="Slide Number Placeholder 5"/>
           <p:cNvSpPr>
             <a:spLocks noGrp="1"/>
           </p:cNvSpPr>
@@ -326,7 +298,7 @@
     </p:spTree>
     <p:extLst>
       <p:ext uri="{BB962C8B-B14F-4D97-AF65-F5344CB8AC3E}">
-        <p14:creationId xmlns:p14="http://schemas.microsoft.com/office/powerpoint/2010/main" val="633920353"/>
+        <p14:creationId xmlns:p14="http://schemas.microsoft.com/office/powerpoint/2010/main" val="3511906760"/>
       </p:ext>
     </p:extLst>
   </p:cSld>
@@ -355,13 +327,7 @@
       </p:grpSpPr>
       <p:sp>
         <p:nvSpPr>
-          <p:cNvPr id="2" name="Title 1">
-            <a:extLst>
-              <a:ext uri="{FF2B5EF4-FFF2-40B4-BE49-F238E27FC236}">
-                <a16:creationId xmlns:a16="http://schemas.microsoft.com/office/drawing/2014/main" id="{5D0ABB82-B7A9-4AFB-AB61-3C41E0466BBA}"/>
-              </a:ext>
-            </a:extLst>
-          </p:cNvPr>
+          <p:cNvPr id="2" name="Title 1"/>
           <p:cNvSpPr>
             <a:spLocks noGrp="1"/>
           </p:cNvSpPr>
@@ -378,18 +344,13 @@
               <a:rPr lang="en-US"/>
               <a:t>Click to edit Master title style</a:t>
             </a:r>
-          </a:p>
-        </p:txBody>
-      </p:sp>
-      <p:sp>
-        <p:nvSpPr>
-          <p:cNvPr id="3" name="Vertical Text Placeholder 2">
-            <a:extLst>
-              <a:ext uri="{FF2B5EF4-FFF2-40B4-BE49-F238E27FC236}">
-                <a16:creationId xmlns:a16="http://schemas.microsoft.com/office/drawing/2014/main" id="{8C9EDF85-FF84-4415-8A9B-258CBF8BD973}"/>
-              </a:ext>
-            </a:extLst>
-          </p:cNvPr>
+            <a:endParaRPr lang="en-US" dirty="0"/>
+          </a:p>
+        </p:txBody>
+      </p:sp>
+      <p:sp>
+        <p:nvSpPr>
+          <p:cNvPr id="3" name="Vertical Text Placeholder 2"/>
           <p:cNvSpPr>
             <a:spLocks noGrp="1"/>
           </p:cNvSpPr>
@@ -435,18 +396,13 @@
               <a:rPr lang="en-US"/>
               <a:t>Fifth level</a:t>
             </a:r>
-          </a:p>
-        </p:txBody>
-      </p:sp>
-      <p:sp>
-        <p:nvSpPr>
-          <p:cNvPr id="4" name="Date Placeholder 3">
-            <a:extLst>
-              <a:ext uri="{FF2B5EF4-FFF2-40B4-BE49-F238E27FC236}">
-                <a16:creationId xmlns:a16="http://schemas.microsoft.com/office/drawing/2014/main" id="{5CEE8F60-B2E9-457A-B0F6-FDB1B91456AF}"/>
-              </a:ext>
-            </a:extLst>
-          </p:cNvPr>
+            <a:endParaRPr lang="en-US" dirty="0"/>
+          </a:p>
+        </p:txBody>
+      </p:sp>
+      <p:sp>
+        <p:nvSpPr>
+          <p:cNvPr id="4" name="Date Placeholder 3"/>
           <p:cNvSpPr>
             <a:spLocks noGrp="1"/>
           </p:cNvSpPr>
@@ -461,7 +417,7 @@
           <a:p>
             <a:fld id="{30450916-ED6A-46E3-AB56-D21E556239AF}" type="datetimeFigureOut">
               <a:rPr lang="en-US" smtClean="0"/>
-              <a:t>3/17/2022</a:t>
+              <a:t>5/15/2022</a:t>
             </a:fld>
             <a:endParaRPr lang="en-US"/>
           </a:p>
@@ -469,13 +425,7 @@
       </p:sp>
       <p:sp>
         <p:nvSpPr>
-          <p:cNvPr id="5" name="Footer Placeholder 4">
-            <a:extLst>
-              <a:ext uri="{FF2B5EF4-FFF2-40B4-BE49-F238E27FC236}">
-                <a16:creationId xmlns:a16="http://schemas.microsoft.com/office/drawing/2014/main" id="{48C8A451-8A15-49D3-983B-62432F218D03}"/>
-              </a:ext>
-            </a:extLst>
-          </p:cNvPr>
+          <p:cNvPr id="5" name="Footer Placeholder 4"/>
           <p:cNvSpPr>
             <a:spLocks noGrp="1"/>
           </p:cNvSpPr>
@@ -494,13 +444,7 @@
       </p:sp>
       <p:sp>
         <p:nvSpPr>
-          <p:cNvPr id="6" name="Slide Number Placeholder 5">
-            <a:extLst>
-              <a:ext uri="{FF2B5EF4-FFF2-40B4-BE49-F238E27FC236}">
-                <a16:creationId xmlns:a16="http://schemas.microsoft.com/office/drawing/2014/main" id="{90517D1C-BA97-4938-AE48-0D80069A4DD5}"/>
-              </a:ext>
-            </a:extLst>
-          </p:cNvPr>
+          <p:cNvPr id="6" name="Slide Number Placeholder 5"/>
           <p:cNvSpPr>
             <a:spLocks noGrp="1"/>
           </p:cNvSpPr>
@@ -524,7 +468,7 @@
     </p:spTree>
     <p:extLst>
       <p:ext uri="{BB962C8B-B14F-4D97-AF65-F5344CB8AC3E}">
-        <p14:creationId xmlns:p14="http://schemas.microsoft.com/office/powerpoint/2010/main" val="3869717145"/>
+        <p14:creationId xmlns:p14="http://schemas.microsoft.com/office/powerpoint/2010/main" val="1413555212"/>
       </p:ext>
     </p:extLst>
   </p:cSld>
@@ -553,13 +497,7 @@
       </p:grpSpPr>
       <p:sp>
         <p:nvSpPr>
-          <p:cNvPr id="2" name="Vertical Title 1">
-            <a:extLst>
-              <a:ext uri="{FF2B5EF4-FFF2-40B4-BE49-F238E27FC236}">
-                <a16:creationId xmlns:a16="http://schemas.microsoft.com/office/drawing/2014/main" id="{ECD3DCD4-F557-46FE-BB93-084F648793D9}"/>
-              </a:ext>
-            </a:extLst>
-          </p:cNvPr>
+          <p:cNvPr id="2" name="Vertical Title 1"/>
           <p:cNvSpPr>
             <a:spLocks noGrp="1"/>
           </p:cNvSpPr>
@@ -581,18 +519,13 @@
               <a:rPr lang="en-US"/>
               <a:t>Click to edit Master title style</a:t>
             </a:r>
-          </a:p>
-        </p:txBody>
-      </p:sp>
-      <p:sp>
-        <p:nvSpPr>
-          <p:cNvPr id="3" name="Vertical Text Placeholder 2">
-            <a:extLst>
-              <a:ext uri="{FF2B5EF4-FFF2-40B4-BE49-F238E27FC236}">
-                <a16:creationId xmlns:a16="http://schemas.microsoft.com/office/drawing/2014/main" id="{5CB745AC-A4D5-4CEA-AED7-FA8FF2F0ECB1}"/>
-              </a:ext>
-            </a:extLst>
-          </p:cNvPr>
+            <a:endParaRPr lang="en-US" dirty="0"/>
+          </a:p>
+        </p:txBody>
+      </p:sp>
+      <p:sp>
+        <p:nvSpPr>
+          <p:cNvPr id="3" name="Vertical Text Placeholder 2"/>
           <p:cNvSpPr>
             <a:spLocks noGrp="1"/>
           </p:cNvSpPr>
@@ -643,18 +576,13 @@
               <a:rPr lang="en-US"/>
               <a:t>Fifth level</a:t>
             </a:r>
-          </a:p>
-        </p:txBody>
-      </p:sp>
-      <p:sp>
-        <p:nvSpPr>
-          <p:cNvPr id="4" name="Date Placeholder 3">
-            <a:extLst>
-              <a:ext uri="{FF2B5EF4-FFF2-40B4-BE49-F238E27FC236}">
-                <a16:creationId xmlns:a16="http://schemas.microsoft.com/office/drawing/2014/main" id="{BD6221A3-3F45-4CF7-A9C6-82245C24A3C9}"/>
-              </a:ext>
-            </a:extLst>
-          </p:cNvPr>
+            <a:endParaRPr lang="en-US" dirty="0"/>
+          </a:p>
+        </p:txBody>
+      </p:sp>
+      <p:sp>
+        <p:nvSpPr>
+          <p:cNvPr id="4" name="Date Placeholder 3"/>
           <p:cNvSpPr>
             <a:spLocks noGrp="1"/>
           </p:cNvSpPr>
@@ -669,7 +597,7 @@
           <a:p>
             <a:fld id="{30450916-ED6A-46E3-AB56-D21E556239AF}" type="datetimeFigureOut">
               <a:rPr lang="en-US" smtClean="0"/>
-              <a:t>3/17/2022</a:t>
+              <a:t>5/15/2022</a:t>
             </a:fld>
             <a:endParaRPr lang="en-US"/>
           </a:p>
@@ -677,13 +605,7 @@
       </p:sp>
       <p:sp>
         <p:nvSpPr>
-          <p:cNvPr id="5" name="Footer Placeholder 4">
-            <a:extLst>
-              <a:ext uri="{FF2B5EF4-FFF2-40B4-BE49-F238E27FC236}">
-                <a16:creationId xmlns:a16="http://schemas.microsoft.com/office/drawing/2014/main" id="{C2118A49-7A4A-4621-9ABA-43A450092DAA}"/>
-              </a:ext>
-            </a:extLst>
-          </p:cNvPr>
+          <p:cNvPr id="5" name="Footer Placeholder 4"/>
           <p:cNvSpPr>
             <a:spLocks noGrp="1"/>
           </p:cNvSpPr>
@@ -702,13 +624,7 @@
       </p:sp>
       <p:sp>
         <p:nvSpPr>
-          <p:cNvPr id="6" name="Slide Number Placeholder 5">
-            <a:extLst>
-              <a:ext uri="{FF2B5EF4-FFF2-40B4-BE49-F238E27FC236}">
-                <a16:creationId xmlns:a16="http://schemas.microsoft.com/office/drawing/2014/main" id="{E2781F26-2588-4729-B1E0-CE20939548B2}"/>
-              </a:ext>
-            </a:extLst>
-          </p:cNvPr>
+          <p:cNvPr id="6" name="Slide Number Placeholder 5"/>
           <p:cNvSpPr>
             <a:spLocks noGrp="1"/>
           </p:cNvSpPr>
@@ -732,7 +648,7 @@
     </p:spTree>
     <p:extLst>
       <p:ext uri="{BB962C8B-B14F-4D97-AF65-F5344CB8AC3E}">
-        <p14:creationId xmlns:p14="http://schemas.microsoft.com/office/powerpoint/2010/main" val="2568812640"/>
+        <p14:creationId xmlns:p14="http://schemas.microsoft.com/office/powerpoint/2010/main" val="2108867792"/>
       </p:ext>
     </p:extLst>
   </p:cSld>
@@ -742,9 +658,9 @@
 </p:sldLayout>
 </file>
 
-<file path=ppt/slideLayouts/slideLayout2.xml><?xml version="1.0" encoding="utf-8"?>
-<p:sldLayout xmlns:a="http://schemas.openxmlformats.org/drawingml/2006/main" xmlns:r="http://schemas.openxmlformats.org/officeDocument/2006/relationships" xmlns:p="http://schemas.openxmlformats.org/presentationml/2006/main" type="obj" preserve="1">
-  <p:cSld name="Title and Content">
+<file path=ppt/slideLayouts/slideLayout12.xml><?xml version="1.0" encoding="utf-8"?>
+<p:sldLayout xmlns:a="http://schemas.openxmlformats.org/drawingml/2006/main" xmlns:r="http://schemas.openxmlformats.org/officeDocument/2006/relationships" xmlns:p="http://schemas.openxmlformats.org/presentationml/2006/main" preserve="1" userDrawn="1">
+  <p:cSld name="1_Blank">
     <p:spTree>
       <p:nvGrpSpPr>
         <p:cNvPr id="1" name=""/>
@@ -761,1297 +677,6 @@
       </p:grpSpPr>
       <p:sp>
         <p:nvSpPr>
-          <p:cNvPr id="2" name="Title 1">
-            <a:extLst>
-              <a:ext uri="{FF2B5EF4-FFF2-40B4-BE49-F238E27FC236}">
-                <a16:creationId xmlns:a16="http://schemas.microsoft.com/office/drawing/2014/main" id="{182F9586-79F5-44DD-A2EE-6E6036426519}"/>
-              </a:ext>
-            </a:extLst>
-          </p:cNvPr>
-          <p:cNvSpPr>
-            <a:spLocks noGrp="1"/>
-          </p:cNvSpPr>
-          <p:nvPr>
-            <p:ph type="title"/>
-          </p:nvPr>
-        </p:nvSpPr>
-        <p:spPr/>
-        <p:txBody>
-          <a:bodyPr/>
-          <a:lstStyle/>
-          <a:p>
-            <a:r>
-              <a:rPr lang="en-US"/>
-              <a:t>Click to edit Master title style</a:t>
-            </a:r>
-          </a:p>
-        </p:txBody>
-      </p:sp>
-      <p:sp>
-        <p:nvSpPr>
-          <p:cNvPr id="3" name="Content Placeholder 2">
-            <a:extLst>
-              <a:ext uri="{FF2B5EF4-FFF2-40B4-BE49-F238E27FC236}">
-                <a16:creationId xmlns:a16="http://schemas.microsoft.com/office/drawing/2014/main" id="{2D31860E-2136-4317-A626-EA501FC7262F}"/>
-              </a:ext>
-            </a:extLst>
-          </p:cNvPr>
-          <p:cNvSpPr>
-            <a:spLocks noGrp="1"/>
-          </p:cNvSpPr>
-          <p:nvPr>
-            <p:ph idx="1"/>
-          </p:nvPr>
-        </p:nvSpPr>
-        <p:spPr/>
-        <p:txBody>
-          <a:bodyPr/>
-          <a:lstStyle/>
-          <a:p>
-            <a:pPr lvl="0"/>
-            <a:r>
-              <a:rPr lang="en-US"/>
-              <a:t>Click to edit Master text styles</a:t>
-            </a:r>
-          </a:p>
-          <a:p>
-            <a:pPr lvl="1"/>
-            <a:r>
-              <a:rPr lang="en-US"/>
-              <a:t>Second level</a:t>
-            </a:r>
-          </a:p>
-          <a:p>
-            <a:pPr lvl="2"/>
-            <a:r>
-              <a:rPr lang="en-US"/>
-              <a:t>Third level</a:t>
-            </a:r>
-          </a:p>
-          <a:p>
-            <a:pPr lvl="3"/>
-            <a:r>
-              <a:rPr lang="en-US"/>
-              <a:t>Fourth level</a:t>
-            </a:r>
-          </a:p>
-          <a:p>
-            <a:pPr lvl="4"/>
-            <a:r>
-              <a:rPr lang="en-US"/>
-              <a:t>Fifth level</a:t>
-            </a:r>
-          </a:p>
-        </p:txBody>
-      </p:sp>
-      <p:sp>
-        <p:nvSpPr>
-          <p:cNvPr id="4" name="Date Placeholder 3">
-            <a:extLst>
-              <a:ext uri="{FF2B5EF4-FFF2-40B4-BE49-F238E27FC236}">
-                <a16:creationId xmlns:a16="http://schemas.microsoft.com/office/drawing/2014/main" id="{F6A5B3C8-C43F-4FFF-A152-EE0973342BDA}"/>
-              </a:ext>
-            </a:extLst>
-          </p:cNvPr>
-          <p:cNvSpPr>
-            <a:spLocks noGrp="1"/>
-          </p:cNvSpPr>
-          <p:nvPr>
-            <p:ph type="dt" sz="half" idx="10"/>
-          </p:nvPr>
-        </p:nvSpPr>
-        <p:spPr/>
-        <p:txBody>
-          <a:bodyPr/>
-          <a:lstStyle/>
-          <a:p>
-            <a:fld id="{30450916-ED6A-46E3-AB56-D21E556239AF}" type="datetimeFigureOut">
-              <a:rPr lang="en-US" smtClean="0"/>
-              <a:t>3/17/2022</a:t>
-            </a:fld>
-            <a:endParaRPr lang="en-US"/>
-          </a:p>
-        </p:txBody>
-      </p:sp>
-      <p:sp>
-        <p:nvSpPr>
-          <p:cNvPr id="5" name="Footer Placeholder 4">
-            <a:extLst>
-              <a:ext uri="{FF2B5EF4-FFF2-40B4-BE49-F238E27FC236}">
-                <a16:creationId xmlns:a16="http://schemas.microsoft.com/office/drawing/2014/main" id="{115C942A-2F41-4CF0-BEDD-9E0C3108FC9E}"/>
-              </a:ext>
-            </a:extLst>
-          </p:cNvPr>
-          <p:cNvSpPr>
-            <a:spLocks noGrp="1"/>
-          </p:cNvSpPr>
-          <p:nvPr>
-            <p:ph type="ftr" sz="quarter" idx="11"/>
-          </p:nvPr>
-        </p:nvSpPr>
-        <p:spPr/>
-        <p:txBody>
-          <a:bodyPr/>
-          <a:lstStyle/>
-          <a:p>
-            <a:endParaRPr lang="en-US"/>
-          </a:p>
-        </p:txBody>
-      </p:sp>
-      <p:sp>
-        <p:nvSpPr>
-          <p:cNvPr id="6" name="Slide Number Placeholder 5">
-            <a:extLst>
-              <a:ext uri="{FF2B5EF4-FFF2-40B4-BE49-F238E27FC236}">
-                <a16:creationId xmlns:a16="http://schemas.microsoft.com/office/drawing/2014/main" id="{50000ADD-F6D1-4492-90B1-811F049A66DE}"/>
-              </a:ext>
-            </a:extLst>
-          </p:cNvPr>
-          <p:cNvSpPr>
-            <a:spLocks noGrp="1"/>
-          </p:cNvSpPr>
-          <p:nvPr>
-            <p:ph type="sldNum" sz="quarter" idx="12"/>
-          </p:nvPr>
-        </p:nvSpPr>
-        <p:spPr/>
-        <p:txBody>
-          <a:bodyPr/>
-          <a:lstStyle/>
-          <a:p>
-            <a:fld id="{E156977E-2058-4299-9B2D-03C8D32EE68A}" type="slidenum">
-              <a:rPr lang="en-US" smtClean="0"/>
-              <a:t>‹#›</a:t>
-            </a:fld>
-            <a:endParaRPr lang="en-US"/>
-          </a:p>
-        </p:txBody>
-      </p:sp>
-    </p:spTree>
-    <p:extLst>
-      <p:ext uri="{BB962C8B-B14F-4D97-AF65-F5344CB8AC3E}">
-        <p14:creationId xmlns:p14="http://schemas.microsoft.com/office/powerpoint/2010/main" val="534995159"/>
-      </p:ext>
-    </p:extLst>
-  </p:cSld>
-  <p:clrMapOvr>
-    <a:masterClrMapping/>
-  </p:clrMapOvr>
-</p:sldLayout>
-</file>
-
-<file path=ppt/slideLayouts/slideLayout3.xml><?xml version="1.0" encoding="utf-8"?>
-<p:sldLayout xmlns:a="http://schemas.openxmlformats.org/drawingml/2006/main" xmlns:r="http://schemas.openxmlformats.org/officeDocument/2006/relationships" xmlns:p="http://schemas.openxmlformats.org/presentationml/2006/main" type="secHead" preserve="1">
-  <p:cSld name="Section Header">
-    <p:spTree>
-      <p:nvGrpSpPr>
-        <p:cNvPr id="1" name=""/>
-        <p:cNvGrpSpPr/>
-        <p:nvPr/>
-      </p:nvGrpSpPr>
-      <p:grpSpPr>
-        <a:xfrm>
-          <a:off x="0" y="0"/>
-          <a:ext cx="0" cy="0"/>
-          <a:chOff x="0" y="0"/>
-          <a:chExt cx="0" cy="0"/>
-        </a:xfrm>
-      </p:grpSpPr>
-      <p:sp>
-        <p:nvSpPr>
-          <p:cNvPr id="2" name="Title 1">
-            <a:extLst>
-              <a:ext uri="{FF2B5EF4-FFF2-40B4-BE49-F238E27FC236}">
-                <a16:creationId xmlns:a16="http://schemas.microsoft.com/office/drawing/2014/main" id="{B6C531EE-2E25-4617-AEC0-BDC63002330D}"/>
-              </a:ext>
-            </a:extLst>
-          </p:cNvPr>
-          <p:cNvSpPr>
-            <a:spLocks noGrp="1"/>
-          </p:cNvSpPr>
-          <p:nvPr>
-            <p:ph type="title"/>
-          </p:nvPr>
-        </p:nvSpPr>
-        <p:spPr>
-          <a:xfrm>
-            <a:off x="831850" y="1709738"/>
-            <a:ext cx="10515600" cy="2852737"/>
-          </a:xfrm>
-        </p:spPr>
-        <p:txBody>
-          <a:bodyPr anchor="b"/>
-          <a:lstStyle>
-            <a:lvl1pPr>
-              <a:defRPr sz="6000"/>
-            </a:lvl1pPr>
-          </a:lstStyle>
-          <a:p>
-            <a:r>
-              <a:rPr lang="en-US"/>
-              <a:t>Click to edit Master title style</a:t>
-            </a:r>
-          </a:p>
-        </p:txBody>
-      </p:sp>
-      <p:sp>
-        <p:nvSpPr>
-          <p:cNvPr id="3" name="Text Placeholder 2">
-            <a:extLst>
-              <a:ext uri="{FF2B5EF4-FFF2-40B4-BE49-F238E27FC236}">
-                <a16:creationId xmlns:a16="http://schemas.microsoft.com/office/drawing/2014/main" id="{E07497E9-F347-4B3F-965A-0A3B258DCE66}"/>
-              </a:ext>
-            </a:extLst>
-          </p:cNvPr>
-          <p:cNvSpPr>
-            <a:spLocks noGrp="1"/>
-          </p:cNvSpPr>
-          <p:nvPr>
-            <p:ph type="body" idx="1"/>
-          </p:nvPr>
-        </p:nvSpPr>
-        <p:spPr>
-          <a:xfrm>
-            <a:off x="831850" y="4589463"/>
-            <a:ext cx="10515600" cy="1500187"/>
-          </a:xfrm>
-        </p:spPr>
-        <p:txBody>
-          <a:bodyPr/>
-          <a:lstStyle>
-            <a:lvl1pPr marL="0" indent="0">
-              <a:buNone/>
-              <a:defRPr sz="2400">
-                <a:solidFill>
-                  <a:schemeClr val="tx1">
-                    <a:tint val="75000"/>
-                  </a:schemeClr>
-                </a:solidFill>
-              </a:defRPr>
-            </a:lvl1pPr>
-            <a:lvl2pPr marL="457200" indent="0">
-              <a:buNone/>
-              <a:defRPr sz="2000">
-                <a:solidFill>
-                  <a:schemeClr val="tx1">
-                    <a:tint val="75000"/>
-                  </a:schemeClr>
-                </a:solidFill>
-              </a:defRPr>
-            </a:lvl2pPr>
-            <a:lvl3pPr marL="914400" indent="0">
-              <a:buNone/>
-              <a:defRPr sz="1800">
-                <a:solidFill>
-                  <a:schemeClr val="tx1">
-                    <a:tint val="75000"/>
-                  </a:schemeClr>
-                </a:solidFill>
-              </a:defRPr>
-            </a:lvl3pPr>
-            <a:lvl4pPr marL="1371600" indent="0">
-              <a:buNone/>
-              <a:defRPr sz="1600">
-                <a:solidFill>
-                  <a:schemeClr val="tx1">
-                    <a:tint val="75000"/>
-                  </a:schemeClr>
-                </a:solidFill>
-              </a:defRPr>
-            </a:lvl4pPr>
-            <a:lvl5pPr marL="1828800" indent="0">
-              <a:buNone/>
-              <a:defRPr sz="1600">
-                <a:solidFill>
-                  <a:schemeClr val="tx1">
-                    <a:tint val="75000"/>
-                  </a:schemeClr>
-                </a:solidFill>
-              </a:defRPr>
-            </a:lvl5pPr>
-            <a:lvl6pPr marL="2286000" indent="0">
-              <a:buNone/>
-              <a:defRPr sz="1600">
-                <a:solidFill>
-                  <a:schemeClr val="tx1">
-                    <a:tint val="75000"/>
-                  </a:schemeClr>
-                </a:solidFill>
-              </a:defRPr>
-            </a:lvl6pPr>
-            <a:lvl7pPr marL="2743200" indent="0">
-              <a:buNone/>
-              <a:defRPr sz="1600">
-                <a:solidFill>
-                  <a:schemeClr val="tx1">
-                    <a:tint val="75000"/>
-                  </a:schemeClr>
-                </a:solidFill>
-              </a:defRPr>
-            </a:lvl7pPr>
-            <a:lvl8pPr marL="3200400" indent="0">
-              <a:buNone/>
-              <a:defRPr sz="1600">
-                <a:solidFill>
-                  <a:schemeClr val="tx1">
-                    <a:tint val="75000"/>
-                  </a:schemeClr>
-                </a:solidFill>
-              </a:defRPr>
-            </a:lvl8pPr>
-            <a:lvl9pPr marL="3657600" indent="0">
-              <a:buNone/>
-              <a:defRPr sz="1600">
-                <a:solidFill>
-                  <a:schemeClr val="tx1">
-                    <a:tint val="75000"/>
-                  </a:schemeClr>
-                </a:solidFill>
-              </a:defRPr>
-            </a:lvl9pPr>
-          </a:lstStyle>
-          <a:p>
-            <a:pPr lvl="0"/>
-            <a:r>
-              <a:rPr lang="en-US"/>
-              <a:t>Click to edit Master text styles</a:t>
-            </a:r>
-          </a:p>
-        </p:txBody>
-      </p:sp>
-      <p:sp>
-        <p:nvSpPr>
-          <p:cNvPr id="4" name="Date Placeholder 3">
-            <a:extLst>
-              <a:ext uri="{FF2B5EF4-FFF2-40B4-BE49-F238E27FC236}">
-                <a16:creationId xmlns:a16="http://schemas.microsoft.com/office/drawing/2014/main" id="{2B0618A7-8B69-4034-B1FE-D9137DA73FFD}"/>
-              </a:ext>
-            </a:extLst>
-          </p:cNvPr>
-          <p:cNvSpPr>
-            <a:spLocks noGrp="1"/>
-          </p:cNvSpPr>
-          <p:nvPr>
-            <p:ph type="dt" sz="half" idx="10"/>
-          </p:nvPr>
-        </p:nvSpPr>
-        <p:spPr/>
-        <p:txBody>
-          <a:bodyPr/>
-          <a:lstStyle/>
-          <a:p>
-            <a:fld id="{30450916-ED6A-46E3-AB56-D21E556239AF}" type="datetimeFigureOut">
-              <a:rPr lang="en-US" smtClean="0"/>
-              <a:t>3/17/2022</a:t>
-            </a:fld>
-            <a:endParaRPr lang="en-US"/>
-          </a:p>
-        </p:txBody>
-      </p:sp>
-      <p:sp>
-        <p:nvSpPr>
-          <p:cNvPr id="5" name="Footer Placeholder 4">
-            <a:extLst>
-              <a:ext uri="{FF2B5EF4-FFF2-40B4-BE49-F238E27FC236}">
-                <a16:creationId xmlns:a16="http://schemas.microsoft.com/office/drawing/2014/main" id="{94EF16B8-A42A-42D1-9CCD-8464F32E38F8}"/>
-              </a:ext>
-            </a:extLst>
-          </p:cNvPr>
-          <p:cNvSpPr>
-            <a:spLocks noGrp="1"/>
-          </p:cNvSpPr>
-          <p:nvPr>
-            <p:ph type="ftr" sz="quarter" idx="11"/>
-          </p:nvPr>
-        </p:nvSpPr>
-        <p:spPr/>
-        <p:txBody>
-          <a:bodyPr/>
-          <a:lstStyle/>
-          <a:p>
-            <a:endParaRPr lang="en-US"/>
-          </a:p>
-        </p:txBody>
-      </p:sp>
-      <p:sp>
-        <p:nvSpPr>
-          <p:cNvPr id="6" name="Slide Number Placeholder 5">
-            <a:extLst>
-              <a:ext uri="{FF2B5EF4-FFF2-40B4-BE49-F238E27FC236}">
-                <a16:creationId xmlns:a16="http://schemas.microsoft.com/office/drawing/2014/main" id="{F5963305-51D1-4CC1-B634-BA124A553622}"/>
-              </a:ext>
-            </a:extLst>
-          </p:cNvPr>
-          <p:cNvSpPr>
-            <a:spLocks noGrp="1"/>
-          </p:cNvSpPr>
-          <p:nvPr>
-            <p:ph type="sldNum" sz="quarter" idx="12"/>
-          </p:nvPr>
-        </p:nvSpPr>
-        <p:spPr/>
-        <p:txBody>
-          <a:bodyPr/>
-          <a:lstStyle/>
-          <a:p>
-            <a:fld id="{E156977E-2058-4299-9B2D-03C8D32EE68A}" type="slidenum">
-              <a:rPr lang="en-US" smtClean="0"/>
-              <a:t>‹#›</a:t>
-            </a:fld>
-            <a:endParaRPr lang="en-US"/>
-          </a:p>
-        </p:txBody>
-      </p:sp>
-    </p:spTree>
-    <p:extLst>
-      <p:ext uri="{BB962C8B-B14F-4D97-AF65-F5344CB8AC3E}">
-        <p14:creationId xmlns:p14="http://schemas.microsoft.com/office/powerpoint/2010/main" val="3441005974"/>
-      </p:ext>
-    </p:extLst>
-  </p:cSld>
-  <p:clrMapOvr>
-    <a:masterClrMapping/>
-  </p:clrMapOvr>
-</p:sldLayout>
-</file>
-
-<file path=ppt/slideLayouts/slideLayout4.xml><?xml version="1.0" encoding="utf-8"?>
-<p:sldLayout xmlns:a="http://schemas.openxmlformats.org/drawingml/2006/main" xmlns:r="http://schemas.openxmlformats.org/officeDocument/2006/relationships" xmlns:p="http://schemas.openxmlformats.org/presentationml/2006/main" type="twoObj" preserve="1">
-  <p:cSld name="Two Content">
-    <p:spTree>
-      <p:nvGrpSpPr>
-        <p:cNvPr id="1" name=""/>
-        <p:cNvGrpSpPr/>
-        <p:nvPr/>
-      </p:nvGrpSpPr>
-      <p:grpSpPr>
-        <a:xfrm>
-          <a:off x="0" y="0"/>
-          <a:ext cx="0" cy="0"/>
-          <a:chOff x="0" y="0"/>
-          <a:chExt cx="0" cy="0"/>
-        </a:xfrm>
-      </p:grpSpPr>
-      <p:sp>
-        <p:nvSpPr>
-          <p:cNvPr id="2" name="Title 1">
-            <a:extLst>
-              <a:ext uri="{FF2B5EF4-FFF2-40B4-BE49-F238E27FC236}">
-                <a16:creationId xmlns:a16="http://schemas.microsoft.com/office/drawing/2014/main" id="{73DF9DA5-C89C-4DFA-8998-34A839B6A684}"/>
-              </a:ext>
-            </a:extLst>
-          </p:cNvPr>
-          <p:cNvSpPr>
-            <a:spLocks noGrp="1"/>
-          </p:cNvSpPr>
-          <p:nvPr>
-            <p:ph type="title"/>
-          </p:nvPr>
-        </p:nvSpPr>
-        <p:spPr/>
-        <p:txBody>
-          <a:bodyPr/>
-          <a:lstStyle/>
-          <a:p>
-            <a:r>
-              <a:rPr lang="en-US"/>
-              <a:t>Click to edit Master title style</a:t>
-            </a:r>
-          </a:p>
-        </p:txBody>
-      </p:sp>
-      <p:sp>
-        <p:nvSpPr>
-          <p:cNvPr id="3" name="Content Placeholder 2">
-            <a:extLst>
-              <a:ext uri="{FF2B5EF4-FFF2-40B4-BE49-F238E27FC236}">
-                <a16:creationId xmlns:a16="http://schemas.microsoft.com/office/drawing/2014/main" id="{7CEBBEDE-EFAF-40E8-94E4-93D39B0FECAD}"/>
-              </a:ext>
-            </a:extLst>
-          </p:cNvPr>
-          <p:cNvSpPr>
-            <a:spLocks noGrp="1"/>
-          </p:cNvSpPr>
-          <p:nvPr>
-            <p:ph sz="half" idx="1"/>
-          </p:nvPr>
-        </p:nvSpPr>
-        <p:spPr>
-          <a:xfrm>
-            <a:off x="838200" y="1825625"/>
-            <a:ext cx="5181600" cy="4351338"/>
-          </a:xfrm>
-        </p:spPr>
-        <p:txBody>
-          <a:bodyPr/>
-          <a:lstStyle/>
-          <a:p>
-            <a:pPr lvl="0"/>
-            <a:r>
-              <a:rPr lang="en-US"/>
-              <a:t>Click to edit Master text styles</a:t>
-            </a:r>
-          </a:p>
-          <a:p>
-            <a:pPr lvl="1"/>
-            <a:r>
-              <a:rPr lang="en-US"/>
-              <a:t>Second level</a:t>
-            </a:r>
-          </a:p>
-          <a:p>
-            <a:pPr lvl="2"/>
-            <a:r>
-              <a:rPr lang="en-US"/>
-              <a:t>Third level</a:t>
-            </a:r>
-          </a:p>
-          <a:p>
-            <a:pPr lvl="3"/>
-            <a:r>
-              <a:rPr lang="en-US"/>
-              <a:t>Fourth level</a:t>
-            </a:r>
-          </a:p>
-          <a:p>
-            <a:pPr lvl="4"/>
-            <a:r>
-              <a:rPr lang="en-US"/>
-              <a:t>Fifth level</a:t>
-            </a:r>
-          </a:p>
-        </p:txBody>
-      </p:sp>
-      <p:sp>
-        <p:nvSpPr>
-          <p:cNvPr id="4" name="Content Placeholder 3">
-            <a:extLst>
-              <a:ext uri="{FF2B5EF4-FFF2-40B4-BE49-F238E27FC236}">
-                <a16:creationId xmlns:a16="http://schemas.microsoft.com/office/drawing/2014/main" id="{08E1F054-7299-4ACC-8202-7C62604A26D3}"/>
-              </a:ext>
-            </a:extLst>
-          </p:cNvPr>
-          <p:cNvSpPr>
-            <a:spLocks noGrp="1"/>
-          </p:cNvSpPr>
-          <p:nvPr>
-            <p:ph sz="half" idx="2"/>
-          </p:nvPr>
-        </p:nvSpPr>
-        <p:spPr>
-          <a:xfrm>
-            <a:off x="6172200" y="1825625"/>
-            <a:ext cx="5181600" cy="4351338"/>
-          </a:xfrm>
-        </p:spPr>
-        <p:txBody>
-          <a:bodyPr/>
-          <a:lstStyle/>
-          <a:p>
-            <a:pPr lvl="0"/>
-            <a:r>
-              <a:rPr lang="en-US"/>
-              <a:t>Click to edit Master text styles</a:t>
-            </a:r>
-          </a:p>
-          <a:p>
-            <a:pPr lvl="1"/>
-            <a:r>
-              <a:rPr lang="en-US"/>
-              <a:t>Second level</a:t>
-            </a:r>
-          </a:p>
-          <a:p>
-            <a:pPr lvl="2"/>
-            <a:r>
-              <a:rPr lang="en-US"/>
-              <a:t>Third level</a:t>
-            </a:r>
-          </a:p>
-          <a:p>
-            <a:pPr lvl="3"/>
-            <a:r>
-              <a:rPr lang="en-US"/>
-              <a:t>Fourth level</a:t>
-            </a:r>
-          </a:p>
-          <a:p>
-            <a:pPr lvl="4"/>
-            <a:r>
-              <a:rPr lang="en-US"/>
-              <a:t>Fifth level</a:t>
-            </a:r>
-          </a:p>
-        </p:txBody>
-      </p:sp>
-      <p:sp>
-        <p:nvSpPr>
-          <p:cNvPr id="5" name="Date Placeholder 4">
-            <a:extLst>
-              <a:ext uri="{FF2B5EF4-FFF2-40B4-BE49-F238E27FC236}">
-                <a16:creationId xmlns:a16="http://schemas.microsoft.com/office/drawing/2014/main" id="{C74487F3-3EE9-471A-99CD-AB6CDE74DD82}"/>
-              </a:ext>
-            </a:extLst>
-          </p:cNvPr>
-          <p:cNvSpPr>
-            <a:spLocks noGrp="1"/>
-          </p:cNvSpPr>
-          <p:nvPr>
-            <p:ph type="dt" sz="half" idx="10"/>
-          </p:nvPr>
-        </p:nvSpPr>
-        <p:spPr/>
-        <p:txBody>
-          <a:bodyPr/>
-          <a:lstStyle/>
-          <a:p>
-            <a:fld id="{30450916-ED6A-46E3-AB56-D21E556239AF}" type="datetimeFigureOut">
-              <a:rPr lang="en-US" smtClean="0"/>
-              <a:t>3/17/2022</a:t>
-            </a:fld>
-            <a:endParaRPr lang="en-US"/>
-          </a:p>
-        </p:txBody>
-      </p:sp>
-      <p:sp>
-        <p:nvSpPr>
-          <p:cNvPr id="6" name="Footer Placeholder 5">
-            <a:extLst>
-              <a:ext uri="{FF2B5EF4-FFF2-40B4-BE49-F238E27FC236}">
-                <a16:creationId xmlns:a16="http://schemas.microsoft.com/office/drawing/2014/main" id="{0E9AAC5C-3368-45AA-879E-8D55D7BDC240}"/>
-              </a:ext>
-            </a:extLst>
-          </p:cNvPr>
-          <p:cNvSpPr>
-            <a:spLocks noGrp="1"/>
-          </p:cNvSpPr>
-          <p:nvPr>
-            <p:ph type="ftr" sz="quarter" idx="11"/>
-          </p:nvPr>
-        </p:nvSpPr>
-        <p:spPr/>
-        <p:txBody>
-          <a:bodyPr/>
-          <a:lstStyle/>
-          <a:p>
-            <a:endParaRPr lang="en-US"/>
-          </a:p>
-        </p:txBody>
-      </p:sp>
-      <p:sp>
-        <p:nvSpPr>
-          <p:cNvPr id="7" name="Slide Number Placeholder 6">
-            <a:extLst>
-              <a:ext uri="{FF2B5EF4-FFF2-40B4-BE49-F238E27FC236}">
-                <a16:creationId xmlns:a16="http://schemas.microsoft.com/office/drawing/2014/main" id="{2C17A5A4-1E9C-4CDA-A3EE-7CBB0487D4FA}"/>
-              </a:ext>
-            </a:extLst>
-          </p:cNvPr>
-          <p:cNvSpPr>
-            <a:spLocks noGrp="1"/>
-          </p:cNvSpPr>
-          <p:nvPr>
-            <p:ph type="sldNum" sz="quarter" idx="12"/>
-          </p:nvPr>
-        </p:nvSpPr>
-        <p:spPr/>
-        <p:txBody>
-          <a:bodyPr/>
-          <a:lstStyle/>
-          <a:p>
-            <a:fld id="{E156977E-2058-4299-9B2D-03C8D32EE68A}" type="slidenum">
-              <a:rPr lang="en-US" smtClean="0"/>
-              <a:t>‹#›</a:t>
-            </a:fld>
-            <a:endParaRPr lang="en-US"/>
-          </a:p>
-        </p:txBody>
-      </p:sp>
-    </p:spTree>
-    <p:extLst>
-      <p:ext uri="{BB962C8B-B14F-4D97-AF65-F5344CB8AC3E}">
-        <p14:creationId xmlns:p14="http://schemas.microsoft.com/office/powerpoint/2010/main" val="2374340904"/>
-      </p:ext>
-    </p:extLst>
-  </p:cSld>
-  <p:clrMapOvr>
-    <a:masterClrMapping/>
-  </p:clrMapOvr>
-</p:sldLayout>
-</file>
-
-<file path=ppt/slideLayouts/slideLayout5.xml><?xml version="1.0" encoding="utf-8"?>
-<p:sldLayout xmlns:a="http://schemas.openxmlformats.org/drawingml/2006/main" xmlns:r="http://schemas.openxmlformats.org/officeDocument/2006/relationships" xmlns:p="http://schemas.openxmlformats.org/presentationml/2006/main" type="twoTxTwoObj" preserve="1">
-  <p:cSld name="Comparison">
-    <p:spTree>
-      <p:nvGrpSpPr>
-        <p:cNvPr id="1" name=""/>
-        <p:cNvGrpSpPr/>
-        <p:nvPr/>
-      </p:nvGrpSpPr>
-      <p:grpSpPr>
-        <a:xfrm>
-          <a:off x="0" y="0"/>
-          <a:ext cx="0" cy="0"/>
-          <a:chOff x="0" y="0"/>
-          <a:chExt cx="0" cy="0"/>
-        </a:xfrm>
-      </p:grpSpPr>
-      <p:sp>
-        <p:nvSpPr>
-          <p:cNvPr id="2" name="Title 1">
-            <a:extLst>
-              <a:ext uri="{FF2B5EF4-FFF2-40B4-BE49-F238E27FC236}">
-                <a16:creationId xmlns:a16="http://schemas.microsoft.com/office/drawing/2014/main" id="{2CA1A597-9A85-4C9B-AC60-2C3E4831FB26}"/>
-              </a:ext>
-            </a:extLst>
-          </p:cNvPr>
-          <p:cNvSpPr>
-            <a:spLocks noGrp="1"/>
-          </p:cNvSpPr>
-          <p:nvPr>
-            <p:ph type="title"/>
-          </p:nvPr>
-        </p:nvSpPr>
-        <p:spPr>
-          <a:xfrm>
-            <a:off x="839788" y="365125"/>
-            <a:ext cx="10515600" cy="1325563"/>
-          </a:xfrm>
-        </p:spPr>
-        <p:txBody>
-          <a:bodyPr/>
-          <a:lstStyle/>
-          <a:p>
-            <a:r>
-              <a:rPr lang="en-US"/>
-              <a:t>Click to edit Master title style</a:t>
-            </a:r>
-          </a:p>
-        </p:txBody>
-      </p:sp>
-      <p:sp>
-        <p:nvSpPr>
-          <p:cNvPr id="3" name="Text Placeholder 2">
-            <a:extLst>
-              <a:ext uri="{FF2B5EF4-FFF2-40B4-BE49-F238E27FC236}">
-                <a16:creationId xmlns:a16="http://schemas.microsoft.com/office/drawing/2014/main" id="{0ECA8098-0D30-4327-BBAA-1D9056334476}"/>
-              </a:ext>
-            </a:extLst>
-          </p:cNvPr>
-          <p:cNvSpPr>
-            <a:spLocks noGrp="1"/>
-          </p:cNvSpPr>
-          <p:nvPr>
-            <p:ph type="body" idx="1"/>
-          </p:nvPr>
-        </p:nvSpPr>
-        <p:spPr>
-          <a:xfrm>
-            <a:off x="839788" y="1681163"/>
-            <a:ext cx="5157787" cy="823912"/>
-          </a:xfrm>
-        </p:spPr>
-        <p:txBody>
-          <a:bodyPr anchor="b"/>
-          <a:lstStyle>
-            <a:lvl1pPr marL="0" indent="0">
-              <a:buNone/>
-              <a:defRPr sz="2400" b="1"/>
-            </a:lvl1pPr>
-            <a:lvl2pPr marL="457200" indent="0">
-              <a:buNone/>
-              <a:defRPr sz="2000" b="1"/>
-            </a:lvl2pPr>
-            <a:lvl3pPr marL="914400" indent="0">
-              <a:buNone/>
-              <a:defRPr sz="1800" b="1"/>
-            </a:lvl3pPr>
-            <a:lvl4pPr marL="1371600" indent="0">
-              <a:buNone/>
-              <a:defRPr sz="1600" b="1"/>
-            </a:lvl4pPr>
-            <a:lvl5pPr marL="1828800" indent="0">
-              <a:buNone/>
-              <a:defRPr sz="1600" b="1"/>
-            </a:lvl5pPr>
-            <a:lvl6pPr marL="2286000" indent="0">
-              <a:buNone/>
-              <a:defRPr sz="1600" b="1"/>
-            </a:lvl6pPr>
-            <a:lvl7pPr marL="2743200" indent="0">
-              <a:buNone/>
-              <a:defRPr sz="1600" b="1"/>
-            </a:lvl7pPr>
-            <a:lvl8pPr marL="3200400" indent="0">
-              <a:buNone/>
-              <a:defRPr sz="1600" b="1"/>
-            </a:lvl8pPr>
-            <a:lvl9pPr marL="3657600" indent="0">
-              <a:buNone/>
-              <a:defRPr sz="1600" b="1"/>
-            </a:lvl9pPr>
-          </a:lstStyle>
-          <a:p>
-            <a:pPr lvl="0"/>
-            <a:r>
-              <a:rPr lang="en-US"/>
-              <a:t>Click to edit Master text styles</a:t>
-            </a:r>
-          </a:p>
-        </p:txBody>
-      </p:sp>
-      <p:sp>
-        <p:nvSpPr>
-          <p:cNvPr id="4" name="Content Placeholder 3">
-            <a:extLst>
-              <a:ext uri="{FF2B5EF4-FFF2-40B4-BE49-F238E27FC236}">
-                <a16:creationId xmlns:a16="http://schemas.microsoft.com/office/drawing/2014/main" id="{E8287C30-1E95-4955-BC70-5E8C40D2DE92}"/>
-              </a:ext>
-            </a:extLst>
-          </p:cNvPr>
-          <p:cNvSpPr>
-            <a:spLocks noGrp="1"/>
-          </p:cNvSpPr>
-          <p:nvPr>
-            <p:ph sz="half" idx="2"/>
-          </p:nvPr>
-        </p:nvSpPr>
-        <p:spPr>
-          <a:xfrm>
-            <a:off x="839788" y="2505075"/>
-            <a:ext cx="5157787" cy="3684588"/>
-          </a:xfrm>
-        </p:spPr>
-        <p:txBody>
-          <a:bodyPr/>
-          <a:lstStyle/>
-          <a:p>
-            <a:pPr lvl="0"/>
-            <a:r>
-              <a:rPr lang="en-US"/>
-              <a:t>Click to edit Master text styles</a:t>
-            </a:r>
-          </a:p>
-          <a:p>
-            <a:pPr lvl="1"/>
-            <a:r>
-              <a:rPr lang="en-US"/>
-              <a:t>Second level</a:t>
-            </a:r>
-          </a:p>
-          <a:p>
-            <a:pPr lvl="2"/>
-            <a:r>
-              <a:rPr lang="en-US"/>
-              <a:t>Third level</a:t>
-            </a:r>
-          </a:p>
-          <a:p>
-            <a:pPr lvl="3"/>
-            <a:r>
-              <a:rPr lang="en-US"/>
-              <a:t>Fourth level</a:t>
-            </a:r>
-          </a:p>
-          <a:p>
-            <a:pPr lvl="4"/>
-            <a:r>
-              <a:rPr lang="en-US"/>
-              <a:t>Fifth level</a:t>
-            </a:r>
-          </a:p>
-        </p:txBody>
-      </p:sp>
-      <p:sp>
-        <p:nvSpPr>
-          <p:cNvPr id="5" name="Text Placeholder 4">
-            <a:extLst>
-              <a:ext uri="{FF2B5EF4-FFF2-40B4-BE49-F238E27FC236}">
-                <a16:creationId xmlns:a16="http://schemas.microsoft.com/office/drawing/2014/main" id="{21B03FD5-6E8A-432B-AD0D-787E8780138F}"/>
-              </a:ext>
-            </a:extLst>
-          </p:cNvPr>
-          <p:cNvSpPr>
-            <a:spLocks noGrp="1"/>
-          </p:cNvSpPr>
-          <p:nvPr>
-            <p:ph type="body" sz="quarter" idx="3"/>
-          </p:nvPr>
-        </p:nvSpPr>
-        <p:spPr>
-          <a:xfrm>
-            <a:off x="6172200" y="1681163"/>
-            <a:ext cx="5183188" cy="823912"/>
-          </a:xfrm>
-        </p:spPr>
-        <p:txBody>
-          <a:bodyPr anchor="b"/>
-          <a:lstStyle>
-            <a:lvl1pPr marL="0" indent="0">
-              <a:buNone/>
-              <a:defRPr sz="2400" b="1"/>
-            </a:lvl1pPr>
-            <a:lvl2pPr marL="457200" indent="0">
-              <a:buNone/>
-              <a:defRPr sz="2000" b="1"/>
-            </a:lvl2pPr>
-            <a:lvl3pPr marL="914400" indent="0">
-              <a:buNone/>
-              <a:defRPr sz="1800" b="1"/>
-            </a:lvl3pPr>
-            <a:lvl4pPr marL="1371600" indent="0">
-              <a:buNone/>
-              <a:defRPr sz="1600" b="1"/>
-            </a:lvl4pPr>
-            <a:lvl5pPr marL="1828800" indent="0">
-              <a:buNone/>
-              <a:defRPr sz="1600" b="1"/>
-            </a:lvl5pPr>
-            <a:lvl6pPr marL="2286000" indent="0">
-              <a:buNone/>
-              <a:defRPr sz="1600" b="1"/>
-            </a:lvl6pPr>
-            <a:lvl7pPr marL="2743200" indent="0">
-              <a:buNone/>
-              <a:defRPr sz="1600" b="1"/>
-            </a:lvl7pPr>
-            <a:lvl8pPr marL="3200400" indent="0">
-              <a:buNone/>
-              <a:defRPr sz="1600" b="1"/>
-            </a:lvl8pPr>
-            <a:lvl9pPr marL="3657600" indent="0">
-              <a:buNone/>
-              <a:defRPr sz="1600" b="1"/>
-            </a:lvl9pPr>
-          </a:lstStyle>
-          <a:p>
-            <a:pPr lvl="0"/>
-            <a:r>
-              <a:rPr lang="en-US"/>
-              <a:t>Click to edit Master text styles</a:t>
-            </a:r>
-          </a:p>
-        </p:txBody>
-      </p:sp>
-      <p:sp>
-        <p:nvSpPr>
-          <p:cNvPr id="6" name="Content Placeholder 5">
-            <a:extLst>
-              <a:ext uri="{FF2B5EF4-FFF2-40B4-BE49-F238E27FC236}">
-                <a16:creationId xmlns:a16="http://schemas.microsoft.com/office/drawing/2014/main" id="{E1B630A2-019F-4F22-9955-6805B50FD8A5}"/>
-              </a:ext>
-            </a:extLst>
-          </p:cNvPr>
-          <p:cNvSpPr>
-            <a:spLocks noGrp="1"/>
-          </p:cNvSpPr>
-          <p:nvPr>
-            <p:ph sz="quarter" idx="4"/>
-          </p:nvPr>
-        </p:nvSpPr>
-        <p:spPr>
-          <a:xfrm>
-            <a:off x="6172200" y="2505075"/>
-            <a:ext cx="5183188" cy="3684588"/>
-          </a:xfrm>
-        </p:spPr>
-        <p:txBody>
-          <a:bodyPr/>
-          <a:lstStyle/>
-          <a:p>
-            <a:pPr lvl="0"/>
-            <a:r>
-              <a:rPr lang="en-US"/>
-              <a:t>Click to edit Master text styles</a:t>
-            </a:r>
-          </a:p>
-          <a:p>
-            <a:pPr lvl="1"/>
-            <a:r>
-              <a:rPr lang="en-US"/>
-              <a:t>Second level</a:t>
-            </a:r>
-          </a:p>
-          <a:p>
-            <a:pPr lvl="2"/>
-            <a:r>
-              <a:rPr lang="en-US"/>
-              <a:t>Third level</a:t>
-            </a:r>
-          </a:p>
-          <a:p>
-            <a:pPr lvl="3"/>
-            <a:r>
-              <a:rPr lang="en-US"/>
-              <a:t>Fourth level</a:t>
-            </a:r>
-          </a:p>
-          <a:p>
-            <a:pPr lvl="4"/>
-            <a:r>
-              <a:rPr lang="en-US"/>
-              <a:t>Fifth level</a:t>
-            </a:r>
-          </a:p>
-        </p:txBody>
-      </p:sp>
-      <p:sp>
-        <p:nvSpPr>
-          <p:cNvPr id="7" name="Date Placeholder 6">
-            <a:extLst>
-              <a:ext uri="{FF2B5EF4-FFF2-40B4-BE49-F238E27FC236}">
-                <a16:creationId xmlns:a16="http://schemas.microsoft.com/office/drawing/2014/main" id="{36AE326C-7EC4-4336-BA66-E5B74196B73A}"/>
-              </a:ext>
-            </a:extLst>
-          </p:cNvPr>
-          <p:cNvSpPr>
-            <a:spLocks noGrp="1"/>
-          </p:cNvSpPr>
-          <p:nvPr>
-            <p:ph type="dt" sz="half" idx="10"/>
-          </p:nvPr>
-        </p:nvSpPr>
-        <p:spPr/>
-        <p:txBody>
-          <a:bodyPr/>
-          <a:lstStyle/>
-          <a:p>
-            <a:fld id="{30450916-ED6A-46E3-AB56-D21E556239AF}" type="datetimeFigureOut">
-              <a:rPr lang="en-US" smtClean="0"/>
-              <a:t>3/17/2022</a:t>
-            </a:fld>
-            <a:endParaRPr lang="en-US"/>
-          </a:p>
-        </p:txBody>
-      </p:sp>
-      <p:sp>
-        <p:nvSpPr>
-          <p:cNvPr id="8" name="Footer Placeholder 7">
-            <a:extLst>
-              <a:ext uri="{FF2B5EF4-FFF2-40B4-BE49-F238E27FC236}">
-                <a16:creationId xmlns:a16="http://schemas.microsoft.com/office/drawing/2014/main" id="{D192D77C-511A-4B1E-8BAD-0200B860A9B5}"/>
-              </a:ext>
-            </a:extLst>
-          </p:cNvPr>
-          <p:cNvSpPr>
-            <a:spLocks noGrp="1"/>
-          </p:cNvSpPr>
-          <p:nvPr>
-            <p:ph type="ftr" sz="quarter" idx="11"/>
-          </p:nvPr>
-        </p:nvSpPr>
-        <p:spPr/>
-        <p:txBody>
-          <a:bodyPr/>
-          <a:lstStyle/>
-          <a:p>
-            <a:endParaRPr lang="en-US"/>
-          </a:p>
-        </p:txBody>
-      </p:sp>
-      <p:sp>
-        <p:nvSpPr>
-          <p:cNvPr id="9" name="Slide Number Placeholder 8">
-            <a:extLst>
-              <a:ext uri="{FF2B5EF4-FFF2-40B4-BE49-F238E27FC236}">
-                <a16:creationId xmlns:a16="http://schemas.microsoft.com/office/drawing/2014/main" id="{C29BAA87-F2B1-48F2-9889-CD78F35B69F8}"/>
-              </a:ext>
-            </a:extLst>
-          </p:cNvPr>
-          <p:cNvSpPr>
-            <a:spLocks noGrp="1"/>
-          </p:cNvSpPr>
-          <p:nvPr>
-            <p:ph type="sldNum" sz="quarter" idx="12"/>
-          </p:nvPr>
-        </p:nvSpPr>
-        <p:spPr/>
-        <p:txBody>
-          <a:bodyPr/>
-          <a:lstStyle/>
-          <a:p>
-            <a:fld id="{E156977E-2058-4299-9B2D-03C8D32EE68A}" type="slidenum">
-              <a:rPr lang="en-US" smtClean="0"/>
-              <a:t>‹#›</a:t>
-            </a:fld>
-            <a:endParaRPr lang="en-US"/>
-          </a:p>
-        </p:txBody>
-      </p:sp>
-    </p:spTree>
-    <p:extLst>
-      <p:ext uri="{BB962C8B-B14F-4D97-AF65-F5344CB8AC3E}">
-        <p14:creationId xmlns:p14="http://schemas.microsoft.com/office/powerpoint/2010/main" val="2825747892"/>
-      </p:ext>
-    </p:extLst>
-  </p:cSld>
-  <p:clrMapOvr>
-    <a:masterClrMapping/>
-  </p:clrMapOvr>
-</p:sldLayout>
-</file>
-
-<file path=ppt/slideLayouts/slideLayout6.xml><?xml version="1.0" encoding="utf-8"?>
-<p:sldLayout xmlns:a="http://schemas.openxmlformats.org/drawingml/2006/main" xmlns:r="http://schemas.openxmlformats.org/officeDocument/2006/relationships" xmlns:p="http://schemas.openxmlformats.org/presentationml/2006/main" type="titleOnly" preserve="1">
-  <p:cSld name="Title Only">
-    <p:spTree>
-      <p:nvGrpSpPr>
-        <p:cNvPr id="1" name=""/>
-        <p:cNvGrpSpPr/>
-        <p:nvPr/>
-      </p:nvGrpSpPr>
-      <p:grpSpPr>
-        <a:xfrm>
-          <a:off x="0" y="0"/>
-          <a:ext cx="0" cy="0"/>
-          <a:chOff x="0" y="0"/>
-          <a:chExt cx="0" cy="0"/>
-        </a:xfrm>
-      </p:grpSpPr>
-      <p:sp>
-        <p:nvSpPr>
-          <p:cNvPr id="2" name="Title 1">
-            <a:extLst>
-              <a:ext uri="{FF2B5EF4-FFF2-40B4-BE49-F238E27FC236}">
-                <a16:creationId xmlns:a16="http://schemas.microsoft.com/office/drawing/2014/main" id="{1D8A95DA-2C7B-4CFB-8F65-30A6E03301CA}"/>
-              </a:ext>
-            </a:extLst>
-          </p:cNvPr>
-          <p:cNvSpPr>
-            <a:spLocks noGrp="1"/>
-          </p:cNvSpPr>
-          <p:nvPr>
-            <p:ph type="title"/>
-          </p:nvPr>
-        </p:nvSpPr>
-        <p:spPr/>
-        <p:txBody>
-          <a:bodyPr/>
-          <a:lstStyle/>
-          <a:p>
-            <a:r>
-              <a:rPr lang="en-US"/>
-              <a:t>Click to edit Master title style</a:t>
-            </a:r>
-          </a:p>
-        </p:txBody>
-      </p:sp>
-      <p:sp>
-        <p:nvSpPr>
-          <p:cNvPr id="3" name="Date Placeholder 2">
-            <a:extLst>
-              <a:ext uri="{FF2B5EF4-FFF2-40B4-BE49-F238E27FC236}">
-                <a16:creationId xmlns:a16="http://schemas.microsoft.com/office/drawing/2014/main" id="{5B577130-6544-4555-AA5D-AC17100AC1C8}"/>
-              </a:ext>
-            </a:extLst>
-          </p:cNvPr>
-          <p:cNvSpPr>
-            <a:spLocks noGrp="1"/>
-          </p:cNvSpPr>
-          <p:nvPr>
-            <p:ph type="dt" sz="half" idx="10"/>
-          </p:nvPr>
-        </p:nvSpPr>
-        <p:spPr/>
-        <p:txBody>
-          <a:bodyPr/>
-          <a:lstStyle/>
-          <a:p>
-            <a:fld id="{30450916-ED6A-46E3-AB56-D21E556239AF}" type="datetimeFigureOut">
-              <a:rPr lang="en-US" smtClean="0"/>
-              <a:t>3/17/2022</a:t>
-            </a:fld>
-            <a:endParaRPr lang="en-US"/>
-          </a:p>
-        </p:txBody>
-      </p:sp>
-      <p:sp>
-        <p:nvSpPr>
-          <p:cNvPr id="4" name="Footer Placeholder 3">
-            <a:extLst>
-              <a:ext uri="{FF2B5EF4-FFF2-40B4-BE49-F238E27FC236}">
-                <a16:creationId xmlns:a16="http://schemas.microsoft.com/office/drawing/2014/main" id="{A8301F67-D328-4B56-ADBE-8DA76E065C24}"/>
-              </a:ext>
-            </a:extLst>
-          </p:cNvPr>
-          <p:cNvSpPr>
-            <a:spLocks noGrp="1"/>
-          </p:cNvSpPr>
-          <p:nvPr>
-            <p:ph type="ftr" sz="quarter" idx="11"/>
-          </p:nvPr>
-        </p:nvSpPr>
-        <p:spPr/>
-        <p:txBody>
-          <a:bodyPr/>
-          <a:lstStyle/>
-          <a:p>
-            <a:endParaRPr lang="en-US"/>
-          </a:p>
-        </p:txBody>
-      </p:sp>
-      <p:sp>
-        <p:nvSpPr>
-          <p:cNvPr id="5" name="Slide Number Placeholder 4">
-            <a:extLst>
-              <a:ext uri="{FF2B5EF4-FFF2-40B4-BE49-F238E27FC236}">
-                <a16:creationId xmlns:a16="http://schemas.microsoft.com/office/drawing/2014/main" id="{EF4C080D-84DE-422E-A032-2645EB5AC406}"/>
-              </a:ext>
-            </a:extLst>
-          </p:cNvPr>
-          <p:cNvSpPr>
-            <a:spLocks noGrp="1"/>
-          </p:cNvSpPr>
-          <p:nvPr>
-            <p:ph type="sldNum" sz="quarter" idx="12"/>
-          </p:nvPr>
-        </p:nvSpPr>
-        <p:spPr/>
-        <p:txBody>
-          <a:bodyPr/>
-          <a:lstStyle/>
-          <a:p>
-            <a:fld id="{E156977E-2058-4299-9B2D-03C8D32EE68A}" type="slidenum">
-              <a:rPr lang="en-US" smtClean="0"/>
-              <a:t>‹#›</a:t>
-            </a:fld>
-            <a:endParaRPr lang="en-US"/>
-          </a:p>
-        </p:txBody>
-      </p:sp>
-    </p:spTree>
-    <p:extLst>
-      <p:ext uri="{BB962C8B-B14F-4D97-AF65-F5344CB8AC3E}">
-        <p14:creationId xmlns:p14="http://schemas.microsoft.com/office/powerpoint/2010/main" val="2083305605"/>
-      </p:ext>
-    </p:extLst>
-  </p:cSld>
-  <p:clrMapOvr>
-    <a:masterClrMapping/>
-  </p:clrMapOvr>
-</p:sldLayout>
-</file>
-
-<file path=ppt/slideLayouts/slideLayout7.xml><?xml version="1.0" encoding="utf-8"?>
-<p:sldLayout xmlns:a="http://schemas.openxmlformats.org/drawingml/2006/main" xmlns:r="http://schemas.openxmlformats.org/officeDocument/2006/relationships" xmlns:p="http://schemas.openxmlformats.org/presentationml/2006/main" preserve="1" userDrawn="1">
-  <p:cSld name="Blank">
-    <p:spTree>
-      <p:nvGrpSpPr>
-        <p:cNvPr id="1" name=""/>
-        <p:cNvGrpSpPr/>
-        <p:nvPr/>
-      </p:nvGrpSpPr>
-      <p:grpSpPr>
-        <a:xfrm>
-          <a:off x="0" y="0"/>
-          <a:ext cx="0" cy="0"/>
-          <a:chOff x="0" y="0"/>
-          <a:chExt cx="0" cy="0"/>
-        </a:xfrm>
-      </p:grpSpPr>
-      <p:sp>
-        <p:nvSpPr>
           <p:cNvPr id="2" name="Date Placeholder 1">
             <a:extLst>
               <a:ext uri="{FF2B5EF4-FFF2-40B4-BE49-F238E27FC236}">
@@ -2073,7 +698,7 @@
           <a:p>
             <a:fld id="{30450916-ED6A-46E3-AB56-D21E556239AF}" type="datetimeFigureOut">
               <a:rPr lang="en-US" smtClean="0"/>
-              <a:t>3/17/2022</a:t>
+              <a:t>5/15/2022</a:t>
             </a:fld>
             <a:endParaRPr lang="en-US"/>
           </a:p>
@@ -2176,6 +801,1264 @@
 </p:sldLayout>
 </file>
 
+<file path=ppt/slideLayouts/slideLayout2.xml><?xml version="1.0" encoding="utf-8"?>
+<p:sldLayout xmlns:a="http://schemas.openxmlformats.org/drawingml/2006/main" xmlns:r="http://schemas.openxmlformats.org/officeDocument/2006/relationships" xmlns:p="http://schemas.openxmlformats.org/presentationml/2006/main" type="obj" preserve="1">
+  <p:cSld name="Title and Content">
+    <p:spTree>
+      <p:nvGrpSpPr>
+        <p:cNvPr id="1" name=""/>
+        <p:cNvGrpSpPr/>
+        <p:nvPr/>
+      </p:nvGrpSpPr>
+      <p:grpSpPr>
+        <a:xfrm>
+          <a:off x="0" y="0"/>
+          <a:ext cx="0" cy="0"/>
+          <a:chOff x="0" y="0"/>
+          <a:chExt cx="0" cy="0"/>
+        </a:xfrm>
+      </p:grpSpPr>
+      <p:sp>
+        <p:nvSpPr>
+          <p:cNvPr id="2" name="Title 1"/>
+          <p:cNvSpPr>
+            <a:spLocks noGrp="1"/>
+          </p:cNvSpPr>
+          <p:nvPr>
+            <p:ph type="title"/>
+          </p:nvPr>
+        </p:nvSpPr>
+        <p:spPr/>
+        <p:txBody>
+          <a:bodyPr/>
+          <a:lstStyle/>
+          <a:p>
+            <a:r>
+              <a:rPr lang="en-US"/>
+              <a:t>Click to edit Master title style</a:t>
+            </a:r>
+            <a:endParaRPr lang="en-US" dirty="0"/>
+          </a:p>
+        </p:txBody>
+      </p:sp>
+      <p:sp>
+        <p:nvSpPr>
+          <p:cNvPr id="3" name="Content Placeholder 2"/>
+          <p:cNvSpPr>
+            <a:spLocks noGrp="1"/>
+          </p:cNvSpPr>
+          <p:nvPr>
+            <p:ph idx="1"/>
+          </p:nvPr>
+        </p:nvSpPr>
+        <p:spPr/>
+        <p:txBody>
+          <a:bodyPr/>
+          <a:lstStyle/>
+          <a:p>
+            <a:pPr lvl="0"/>
+            <a:r>
+              <a:rPr lang="en-US"/>
+              <a:t>Click to edit Master text styles</a:t>
+            </a:r>
+          </a:p>
+          <a:p>
+            <a:pPr lvl="1"/>
+            <a:r>
+              <a:rPr lang="en-US"/>
+              <a:t>Second level</a:t>
+            </a:r>
+          </a:p>
+          <a:p>
+            <a:pPr lvl="2"/>
+            <a:r>
+              <a:rPr lang="en-US"/>
+              <a:t>Third level</a:t>
+            </a:r>
+          </a:p>
+          <a:p>
+            <a:pPr lvl="3"/>
+            <a:r>
+              <a:rPr lang="en-US"/>
+              <a:t>Fourth level</a:t>
+            </a:r>
+          </a:p>
+          <a:p>
+            <a:pPr lvl="4"/>
+            <a:r>
+              <a:rPr lang="en-US"/>
+              <a:t>Fifth level</a:t>
+            </a:r>
+            <a:endParaRPr lang="en-US" dirty="0"/>
+          </a:p>
+        </p:txBody>
+      </p:sp>
+      <p:sp>
+        <p:nvSpPr>
+          <p:cNvPr id="4" name="Date Placeholder 3"/>
+          <p:cNvSpPr>
+            <a:spLocks noGrp="1"/>
+          </p:cNvSpPr>
+          <p:nvPr>
+            <p:ph type="dt" sz="half" idx="10"/>
+          </p:nvPr>
+        </p:nvSpPr>
+        <p:spPr/>
+        <p:txBody>
+          <a:bodyPr/>
+          <a:lstStyle/>
+          <a:p>
+            <a:fld id="{30450916-ED6A-46E3-AB56-D21E556239AF}" type="datetimeFigureOut">
+              <a:rPr lang="en-US" smtClean="0"/>
+              <a:t>5/15/2022</a:t>
+            </a:fld>
+            <a:endParaRPr lang="en-US"/>
+          </a:p>
+        </p:txBody>
+      </p:sp>
+      <p:sp>
+        <p:nvSpPr>
+          <p:cNvPr id="5" name="Footer Placeholder 4"/>
+          <p:cNvSpPr>
+            <a:spLocks noGrp="1"/>
+          </p:cNvSpPr>
+          <p:nvPr>
+            <p:ph type="ftr" sz="quarter" idx="11"/>
+          </p:nvPr>
+        </p:nvSpPr>
+        <p:spPr/>
+        <p:txBody>
+          <a:bodyPr/>
+          <a:lstStyle/>
+          <a:p>
+            <a:endParaRPr lang="en-US"/>
+          </a:p>
+        </p:txBody>
+      </p:sp>
+      <p:sp>
+        <p:nvSpPr>
+          <p:cNvPr id="6" name="Slide Number Placeholder 5"/>
+          <p:cNvSpPr>
+            <a:spLocks noGrp="1"/>
+          </p:cNvSpPr>
+          <p:nvPr>
+            <p:ph type="sldNum" sz="quarter" idx="12"/>
+          </p:nvPr>
+        </p:nvSpPr>
+        <p:spPr/>
+        <p:txBody>
+          <a:bodyPr/>
+          <a:lstStyle/>
+          <a:p>
+            <a:fld id="{E156977E-2058-4299-9B2D-03C8D32EE68A}" type="slidenum">
+              <a:rPr lang="en-US" smtClean="0"/>
+              <a:t>‹#›</a:t>
+            </a:fld>
+            <a:endParaRPr lang="en-US"/>
+          </a:p>
+        </p:txBody>
+      </p:sp>
+    </p:spTree>
+    <p:extLst>
+      <p:ext uri="{BB962C8B-B14F-4D97-AF65-F5344CB8AC3E}">
+        <p14:creationId xmlns:p14="http://schemas.microsoft.com/office/powerpoint/2010/main" val="754277379"/>
+      </p:ext>
+    </p:extLst>
+  </p:cSld>
+  <p:clrMapOvr>
+    <a:masterClrMapping/>
+  </p:clrMapOvr>
+</p:sldLayout>
+</file>
+
+<file path=ppt/slideLayouts/slideLayout3.xml><?xml version="1.0" encoding="utf-8"?>
+<p:sldLayout xmlns:a="http://schemas.openxmlformats.org/drawingml/2006/main" xmlns:r="http://schemas.openxmlformats.org/officeDocument/2006/relationships" xmlns:p="http://schemas.openxmlformats.org/presentationml/2006/main" type="secHead" preserve="1">
+  <p:cSld name="Section Header">
+    <p:spTree>
+      <p:nvGrpSpPr>
+        <p:cNvPr id="1" name=""/>
+        <p:cNvGrpSpPr/>
+        <p:nvPr/>
+      </p:nvGrpSpPr>
+      <p:grpSpPr>
+        <a:xfrm>
+          <a:off x="0" y="0"/>
+          <a:ext cx="0" cy="0"/>
+          <a:chOff x="0" y="0"/>
+          <a:chExt cx="0" cy="0"/>
+        </a:xfrm>
+      </p:grpSpPr>
+      <p:sp>
+        <p:nvSpPr>
+          <p:cNvPr id="2" name="Title 1"/>
+          <p:cNvSpPr>
+            <a:spLocks noGrp="1"/>
+          </p:cNvSpPr>
+          <p:nvPr>
+            <p:ph type="title"/>
+          </p:nvPr>
+        </p:nvSpPr>
+        <p:spPr>
+          <a:xfrm>
+            <a:off x="831850" y="1709738"/>
+            <a:ext cx="10515600" cy="2852737"/>
+          </a:xfrm>
+        </p:spPr>
+        <p:txBody>
+          <a:bodyPr anchor="b"/>
+          <a:lstStyle>
+            <a:lvl1pPr>
+              <a:defRPr sz="6000"/>
+            </a:lvl1pPr>
+          </a:lstStyle>
+          <a:p>
+            <a:r>
+              <a:rPr lang="en-US"/>
+              <a:t>Click to edit Master title style</a:t>
+            </a:r>
+            <a:endParaRPr lang="en-US" dirty="0"/>
+          </a:p>
+        </p:txBody>
+      </p:sp>
+      <p:sp>
+        <p:nvSpPr>
+          <p:cNvPr id="3" name="Text Placeholder 2"/>
+          <p:cNvSpPr>
+            <a:spLocks noGrp="1"/>
+          </p:cNvSpPr>
+          <p:nvPr>
+            <p:ph type="body" idx="1"/>
+          </p:nvPr>
+        </p:nvSpPr>
+        <p:spPr>
+          <a:xfrm>
+            <a:off x="831850" y="4589463"/>
+            <a:ext cx="10515600" cy="1500187"/>
+          </a:xfrm>
+        </p:spPr>
+        <p:txBody>
+          <a:bodyPr/>
+          <a:lstStyle>
+            <a:lvl1pPr marL="0" indent="0">
+              <a:buNone/>
+              <a:defRPr sz="2400">
+                <a:solidFill>
+                  <a:schemeClr val="tx1">
+                    <a:tint val="75000"/>
+                  </a:schemeClr>
+                </a:solidFill>
+              </a:defRPr>
+            </a:lvl1pPr>
+            <a:lvl2pPr marL="457200" indent="0">
+              <a:buNone/>
+              <a:defRPr sz="2000">
+                <a:solidFill>
+                  <a:schemeClr val="tx1">
+                    <a:tint val="75000"/>
+                  </a:schemeClr>
+                </a:solidFill>
+              </a:defRPr>
+            </a:lvl2pPr>
+            <a:lvl3pPr marL="914400" indent="0">
+              <a:buNone/>
+              <a:defRPr sz="1800">
+                <a:solidFill>
+                  <a:schemeClr val="tx1">
+                    <a:tint val="75000"/>
+                  </a:schemeClr>
+                </a:solidFill>
+              </a:defRPr>
+            </a:lvl3pPr>
+            <a:lvl4pPr marL="1371600" indent="0">
+              <a:buNone/>
+              <a:defRPr sz="1600">
+                <a:solidFill>
+                  <a:schemeClr val="tx1">
+                    <a:tint val="75000"/>
+                  </a:schemeClr>
+                </a:solidFill>
+              </a:defRPr>
+            </a:lvl4pPr>
+            <a:lvl5pPr marL="1828800" indent="0">
+              <a:buNone/>
+              <a:defRPr sz="1600">
+                <a:solidFill>
+                  <a:schemeClr val="tx1">
+                    <a:tint val="75000"/>
+                  </a:schemeClr>
+                </a:solidFill>
+              </a:defRPr>
+            </a:lvl5pPr>
+            <a:lvl6pPr marL="2286000" indent="0">
+              <a:buNone/>
+              <a:defRPr sz="1600">
+                <a:solidFill>
+                  <a:schemeClr val="tx1">
+                    <a:tint val="75000"/>
+                  </a:schemeClr>
+                </a:solidFill>
+              </a:defRPr>
+            </a:lvl6pPr>
+            <a:lvl7pPr marL="2743200" indent="0">
+              <a:buNone/>
+              <a:defRPr sz="1600">
+                <a:solidFill>
+                  <a:schemeClr val="tx1">
+                    <a:tint val="75000"/>
+                  </a:schemeClr>
+                </a:solidFill>
+              </a:defRPr>
+            </a:lvl7pPr>
+            <a:lvl8pPr marL="3200400" indent="0">
+              <a:buNone/>
+              <a:defRPr sz="1600">
+                <a:solidFill>
+                  <a:schemeClr val="tx1">
+                    <a:tint val="75000"/>
+                  </a:schemeClr>
+                </a:solidFill>
+              </a:defRPr>
+            </a:lvl8pPr>
+            <a:lvl9pPr marL="3657600" indent="0">
+              <a:buNone/>
+              <a:defRPr sz="1600">
+                <a:solidFill>
+                  <a:schemeClr val="tx1">
+                    <a:tint val="75000"/>
+                  </a:schemeClr>
+                </a:solidFill>
+              </a:defRPr>
+            </a:lvl9pPr>
+          </a:lstStyle>
+          <a:p>
+            <a:pPr lvl="0"/>
+            <a:r>
+              <a:rPr lang="en-US"/>
+              <a:t>Click to edit Master text styles</a:t>
+            </a:r>
+          </a:p>
+        </p:txBody>
+      </p:sp>
+      <p:sp>
+        <p:nvSpPr>
+          <p:cNvPr id="4" name="Date Placeholder 3"/>
+          <p:cNvSpPr>
+            <a:spLocks noGrp="1"/>
+          </p:cNvSpPr>
+          <p:nvPr>
+            <p:ph type="dt" sz="half" idx="10"/>
+          </p:nvPr>
+        </p:nvSpPr>
+        <p:spPr/>
+        <p:txBody>
+          <a:bodyPr/>
+          <a:lstStyle/>
+          <a:p>
+            <a:fld id="{30450916-ED6A-46E3-AB56-D21E556239AF}" type="datetimeFigureOut">
+              <a:rPr lang="en-US" smtClean="0"/>
+              <a:t>5/15/2022</a:t>
+            </a:fld>
+            <a:endParaRPr lang="en-US"/>
+          </a:p>
+        </p:txBody>
+      </p:sp>
+      <p:sp>
+        <p:nvSpPr>
+          <p:cNvPr id="5" name="Footer Placeholder 4"/>
+          <p:cNvSpPr>
+            <a:spLocks noGrp="1"/>
+          </p:cNvSpPr>
+          <p:nvPr>
+            <p:ph type="ftr" sz="quarter" idx="11"/>
+          </p:nvPr>
+        </p:nvSpPr>
+        <p:spPr/>
+        <p:txBody>
+          <a:bodyPr/>
+          <a:lstStyle/>
+          <a:p>
+            <a:endParaRPr lang="en-US"/>
+          </a:p>
+        </p:txBody>
+      </p:sp>
+      <p:sp>
+        <p:nvSpPr>
+          <p:cNvPr id="6" name="Slide Number Placeholder 5"/>
+          <p:cNvSpPr>
+            <a:spLocks noGrp="1"/>
+          </p:cNvSpPr>
+          <p:nvPr>
+            <p:ph type="sldNum" sz="quarter" idx="12"/>
+          </p:nvPr>
+        </p:nvSpPr>
+        <p:spPr/>
+        <p:txBody>
+          <a:bodyPr/>
+          <a:lstStyle/>
+          <a:p>
+            <a:fld id="{E156977E-2058-4299-9B2D-03C8D32EE68A}" type="slidenum">
+              <a:rPr lang="en-US" smtClean="0"/>
+              <a:t>‹#›</a:t>
+            </a:fld>
+            <a:endParaRPr lang="en-US"/>
+          </a:p>
+        </p:txBody>
+      </p:sp>
+    </p:spTree>
+    <p:extLst>
+      <p:ext uri="{BB962C8B-B14F-4D97-AF65-F5344CB8AC3E}">
+        <p14:creationId xmlns:p14="http://schemas.microsoft.com/office/powerpoint/2010/main" val="861936987"/>
+      </p:ext>
+    </p:extLst>
+  </p:cSld>
+  <p:clrMapOvr>
+    <a:masterClrMapping/>
+  </p:clrMapOvr>
+</p:sldLayout>
+</file>
+
+<file path=ppt/slideLayouts/slideLayout4.xml><?xml version="1.0" encoding="utf-8"?>
+<p:sldLayout xmlns:a="http://schemas.openxmlformats.org/drawingml/2006/main" xmlns:r="http://schemas.openxmlformats.org/officeDocument/2006/relationships" xmlns:p="http://schemas.openxmlformats.org/presentationml/2006/main" type="twoObj" preserve="1">
+  <p:cSld name="Two Content">
+    <p:spTree>
+      <p:nvGrpSpPr>
+        <p:cNvPr id="1" name=""/>
+        <p:cNvGrpSpPr/>
+        <p:nvPr/>
+      </p:nvGrpSpPr>
+      <p:grpSpPr>
+        <a:xfrm>
+          <a:off x="0" y="0"/>
+          <a:ext cx="0" cy="0"/>
+          <a:chOff x="0" y="0"/>
+          <a:chExt cx="0" cy="0"/>
+        </a:xfrm>
+      </p:grpSpPr>
+      <p:sp>
+        <p:nvSpPr>
+          <p:cNvPr id="2" name="Title 1"/>
+          <p:cNvSpPr>
+            <a:spLocks noGrp="1"/>
+          </p:cNvSpPr>
+          <p:nvPr>
+            <p:ph type="title"/>
+          </p:nvPr>
+        </p:nvSpPr>
+        <p:spPr/>
+        <p:txBody>
+          <a:bodyPr/>
+          <a:lstStyle/>
+          <a:p>
+            <a:r>
+              <a:rPr lang="en-US"/>
+              <a:t>Click to edit Master title style</a:t>
+            </a:r>
+            <a:endParaRPr lang="en-US" dirty="0"/>
+          </a:p>
+        </p:txBody>
+      </p:sp>
+      <p:sp>
+        <p:nvSpPr>
+          <p:cNvPr id="3" name="Content Placeholder 2"/>
+          <p:cNvSpPr>
+            <a:spLocks noGrp="1"/>
+          </p:cNvSpPr>
+          <p:nvPr>
+            <p:ph sz="half" idx="1"/>
+          </p:nvPr>
+        </p:nvSpPr>
+        <p:spPr>
+          <a:xfrm>
+            <a:off x="838200" y="1825625"/>
+            <a:ext cx="5181600" cy="4351338"/>
+          </a:xfrm>
+        </p:spPr>
+        <p:txBody>
+          <a:bodyPr/>
+          <a:lstStyle/>
+          <a:p>
+            <a:pPr lvl="0"/>
+            <a:r>
+              <a:rPr lang="en-US"/>
+              <a:t>Click to edit Master text styles</a:t>
+            </a:r>
+          </a:p>
+          <a:p>
+            <a:pPr lvl="1"/>
+            <a:r>
+              <a:rPr lang="en-US"/>
+              <a:t>Second level</a:t>
+            </a:r>
+          </a:p>
+          <a:p>
+            <a:pPr lvl="2"/>
+            <a:r>
+              <a:rPr lang="en-US"/>
+              <a:t>Third level</a:t>
+            </a:r>
+          </a:p>
+          <a:p>
+            <a:pPr lvl="3"/>
+            <a:r>
+              <a:rPr lang="en-US"/>
+              <a:t>Fourth level</a:t>
+            </a:r>
+          </a:p>
+          <a:p>
+            <a:pPr lvl="4"/>
+            <a:r>
+              <a:rPr lang="en-US"/>
+              <a:t>Fifth level</a:t>
+            </a:r>
+            <a:endParaRPr lang="en-US" dirty="0"/>
+          </a:p>
+        </p:txBody>
+      </p:sp>
+      <p:sp>
+        <p:nvSpPr>
+          <p:cNvPr id="4" name="Content Placeholder 3"/>
+          <p:cNvSpPr>
+            <a:spLocks noGrp="1"/>
+          </p:cNvSpPr>
+          <p:nvPr>
+            <p:ph sz="half" idx="2"/>
+          </p:nvPr>
+        </p:nvSpPr>
+        <p:spPr>
+          <a:xfrm>
+            <a:off x="6172200" y="1825625"/>
+            <a:ext cx="5181600" cy="4351338"/>
+          </a:xfrm>
+        </p:spPr>
+        <p:txBody>
+          <a:bodyPr/>
+          <a:lstStyle/>
+          <a:p>
+            <a:pPr lvl="0"/>
+            <a:r>
+              <a:rPr lang="en-US"/>
+              <a:t>Click to edit Master text styles</a:t>
+            </a:r>
+          </a:p>
+          <a:p>
+            <a:pPr lvl="1"/>
+            <a:r>
+              <a:rPr lang="en-US"/>
+              <a:t>Second level</a:t>
+            </a:r>
+          </a:p>
+          <a:p>
+            <a:pPr lvl="2"/>
+            <a:r>
+              <a:rPr lang="en-US"/>
+              <a:t>Third level</a:t>
+            </a:r>
+          </a:p>
+          <a:p>
+            <a:pPr lvl="3"/>
+            <a:r>
+              <a:rPr lang="en-US"/>
+              <a:t>Fourth level</a:t>
+            </a:r>
+          </a:p>
+          <a:p>
+            <a:pPr lvl="4"/>
+            <a:r>
+              <a:rPr lang="en-US"/>
+              <a:t>Fifth level</a:t>
+            </a:r>
+            <a:endParaRPr lang="en-US" dirty="0"/>
+          </a:p>
+        </p:txBody>
+      </p:sp>
+      <p:sp>
+        <p:nvSpPr>
+          <p:cNvPr id="5" name="Date Placeholder 4"/>
+          <p:cNvSpPr>
+            <a:spLocks noGrp="1"/>
+          </p:cNvSpPr>
+          <p:nvPr>
+            <p:ph type="dt" sz="half" idx="10"/>
+          </p:nvPr>
+        </p:nvSpPr>
+        <p:spPr/>
+        <p:txBody>
+          <a:bodyPr/>
+          <a:lstStyle/>
+          <a:p>
+            <a:fld id="{30450916-ED6A-46E3-AB56-D21E556239AF}" type="datetimeFigureOut">
+              <a:rPr lang="en-US" smtClean="0"/>
+              <a:t>5/15/2022</a:t>
+            </a:fld>
+            <a:endParaRPr lang="en-US"/>
+          </a:p>
+        </p:txBody>
+      </p:sp>
+      <p:sp>
+        <p:nvSpPr>
+          <p:cNvPr id="6" name="Footer Placeholder 5"/>
+          <p:cNvSpPr>
+            <a:spLocks noGrp="1"/>
+          </p:cNvSpPr>
+          <p:nvPr>
+            <p:ph type="ftr" sz="quarter" idx="11"/>
+          </p:nvPr>
+        </p:nvSpPr>
+        <p:spPr/>
+        <p:txBody>
+          <a:bodyPr/>
+          <a:lstStyle/>
+          <a:p>
+            <a:endParaRPr lang="en-US"/>
+          </a:p>
+        </p:txBody>
+      </p:sp>
+      <p:sp>
+        <p:nvSpPr>
+          <p:cNvPr id="7" name="Slide Number Placeholder 6"/>
+          <p:cNvSpPr>
+            <a:spLocks noGrp="1"/>
+          </p:cNvSpPr>
+          <p:nvPr>
+            <p:ph type="sldNum" sz="quarter" idx="12"/>
+          </p:nvPr>
+        </p:nvSpPr>
+        <p:spPr/>
+        <p:txBody>
+          <a:bodyPr/>
+          <a:lstStyle/>
+          <a:p>
+            <a:fld id="{E156977E-2058-4299-9B2D-03C8D32EE68A}" type="slidenum">
+              <a:rPr lang="en-US" smtClean="0"/>
+              <a:t>‹#›</a:t>
+            </a:fld>
+            <a:endParaRPr lang="en-US"/>
+          </a:p>
+        </p:txBody>
+      </p:sp>
+    </p:spTree>
+    <p:extLst>
+      <p:ext uri="{BB962C8B-B14F-4D97-AF65-F5344CB8AC3E}">
+        <p14:creationId xmlns:p14="http://schemas.microsoft.com/office/powerpoint/2010/main" val="213071519"/>
+      </p:ext>
+    </p:extLst>
+  </p:cSld>
+  <p:clrMapOvr>
+    <a:masterClrMapping/>
+  </p:clrMapOvr>
+</p:sldLayout>
+</file>
+
+<file path=ppt/slideLayouts/slideLayout5.xml><?xml version="1.0" encoding="utf-8"?>
+<p:sldLayout xmlns:a="http://schemas.openxmlformats.org/drawingml/2006/main" xmlns:r="http://schemas.openxmlformats.org/officeDocument/2006/relationships" xmlns:p="http://schemas.openxmlformats.org/presentationml/2006/main" type="twoTxTwoObj" preserve="1">
+  <p:cSld name="Comparison">
+    <p:spTree>
+      <p:nvGrpSpPr>
+        <p:cNvPr id="1" name=""/>
+        <p:cNvGrpSpPr/>
+        <p:nvPr/>
+      </p:nvGrpSpPr>
+      <p:grpSpPr>
+        <a:xfrm>
+          <a:off x="0" y="0"/>
+          <a:ext cx="0" cy="0"/>
+          <a:chOff x="0" y="0"/>
+          <a:chExt cx="0" cy="0"/>
+        </a:xfrm>
+      </p:grpSpPr>
+      <p:sp>
+        <p:nvSpPr>
+          <p:cNvPr id="2" name="Title 1"/>
+          <p:cNvSpPr>
+            <a:spLocks noGrp="1"/>
+          </p:cNvSpPr>
+          <p:nvPr>
+            <p:ph type="title"/>
+          </p:nvPr>
+        </p:nvSpPr>
+        <p:spPr>
+          <a:xfrm>
+            <a:off x="839788" y="365125"/>
+            <a:ext cx="10515600" cy="1325563"/>
+          </a:xfrm>
+        </p:spPr>
+        <p:txBody>
+          <a:bodyPr/>
+          <a:lstStyle/>
+          <a:p>
+            <a:r>
+              <a:rPr lang="en-US"/>
+              <a:t>Click to edit Master title style</a:t>
+            </a:r>
+            <a:endParaRPr lang="en-US" dirty="0"/>
+          </a:p>
+        </p:txBody>
+      </p:sp>
+      <p:sp>
+        <p:nvSpPr>
+          <p:cNvPr id="3" name="Text Placeholder 2"/>
+          <p:cNvSpPr>
+            <a:spLocks noGrp="1"/>
+          </p:cNvSpPr>
+          <p:nvPr>
+            <p:ph type="body" idx="1"/>
+          </p:nvPr>
+        </p:nvSpPr>
+        <p:spPr>
+          <a:xfrm>
+            <a:off x="839788" y="1681163"/>
+            <a:ext cx="5157787" cy="823912"/>
+          </a:xfrm>
+        </p:spPr>
+        <p:txBody>
+          <a:bodyPr anchor="b"/>
+          <a:lstStyle>
+            <a:lvl1pPr marL="0" indent="0">
+              <a:buNone/>
+              <a:defRPr sz="2400" b="1"/>
+            </a:lvl1pPr>
+            <a:lvl2pPr marL="457200" indent="0">
+              <a:buNone/>
+              <a:defRPr sz="2000" b="1"/>
+            </a:lvl2pPr>
+            <a:lvl3pPr marL="914400" indent="0">
+              <a:buNone/>
+              <a:defRPr sz="1800" b="1"/>
+            </a:lvl3pPr>
+            <a:lvl4pPr marL="1371600" indent="0">
+              <a:buNone/>
+              <a:defRPr sz="1600" b="1"/>
+            </a:lvl4pPr>
+            <a:lvl5pPr marL="1828800" indent="0">
+              <a:buNone/>
+              <a:defRPr sz="1600" b="1"/>
+            </a:lvl5pPr>
+            <a:lvl6pPr marL="2286000" indent="0">
+              <a:buNone/>
+              <a:defRPr sz="1600" b="1"/>
+            </a:lvl6pPr>
+            <a:lvl7pPr marL="2743200" indent="0">
+              <a:buNone/>
+              <a:defRPr sz="1600" b="1"/>
+            </a:lvl7pPr>
+            <a:lvl8pPr marL="3200400" indent="0">
+              <a:buNone/>
+              <a:defRPr sz="1600" b="1"/>
+            </a:lvl8pPr>
+            <a:lvl9pPr marL="3657600" indent="0">
+              <a:buNone/>
+              <a:defRPr sz="1600" b="1"/>
+            </a:lvl9pPr>
+          </a:lstStyle>
+          <a:p>
+            <a:pPr lvl="0"/>
+            <a:r>
+              <a:rPr lang="en-US"/>
+              <a:t>Click to edit Master text styles</a:t>
+            </a:r>
+          </a:p>
+        </p:txBody>
+      </p:sp>
+      <p:sp>
+        <p:nvSpPr>
+          <p:cNvPr id="4" name="Content Placeholder 3"/>
+          <p:cNvSpPr>
+            <a:spLocks noGrp="1"/>
+          </p:cNvSpPr>
+          <p:nvPr>
+            <p:ph sz="half" idx="2"/>
+          </p:nvPr>
+        </p:nvSpPr>
+        <p:spPr>
+          <a:xfrm>
+            <a:off x="839788" y="2505075"/>
+            <a:ext cx="5157787" cy="3684588"/>
+          </a:xfrm>
+        </p:spPr>
+        <p:txBody>
+          <a:bodyPr/>
+          <a:lstStyle/>
+          <a:p>
+            <a:pPr lvl="0"/>
+            <a:r>
+              <a:rPr lang="en-US"/>
+              <a:t>Click to edit Master text styles</a:t>
+            </a:r>
+          </a:p>
+          <a:p>
+            <a:pPr lvl="1"/>
+            <a:r>
+              <a:rPr lang="en-US"/>
+              <a:t>Second level</a:t>
+            </a:r>
+          </a:p>
+          <a:p>
+            <a:pPr lvl="2"/>
+            <a:r>
+              <a:rPr lang="en-US"/>
+              <a:t>Third level</a:t>
+            </a:r>
+          </a:p>
+          <a:p>
+            <a:pPr lvl="3"/>
+            <a:r>
+              <a:rPr lang="en-US"/>
+              <a:t>Fourth level</a:t>
+            </a:r>
+          </a:p>
+          <a:p>
+            <a:pPr lvl="4"/>
+            <a:r>
+              <a:rPr lang="en-US"/>
+              <a:t>Fifth level</a:t>
+            </a:r>
+            <a:endParaRPr lang="en-US" dirty="0"/>
+          </a:p>
+        </p:txBody>
+      </p:sp>
+      <p:sp>
+        <p:nvSpPr>
+          <p:cNvPr id="5" name="Text Placeholder 4"/>
+          <p:cNvSpPr>
+            <a:spLocks noGrp="1"/>
+          </p:cNvSpPr>
+          <p:nvPr>
+            <p:ph type="body" sz="quarter" idx="3"/>
+          </p:nvPr>
+        </p:nvSpPr>
+        <p:spPr>
+          <a:xfrm>
+            <a:off x="6172200" y="1681163"/>
+            <a:ext cx="5183188" cy="823912"/>
+          </a:xfrm>
+        </p:spPr>
+        <p:txBody>
+          <a:bodyPr anchor="b"/>
+          <a:lstStyle>
+            <a:lvl1pPr marL="0" indent="0">
+              <a:buNone/>
+              <a:defRPr sz="2400" b="1"/>
+            </a:lvl1pPr>
+            <a:lvl2pPr marL="457200" indent="0">
+              <a:buNone/>
+              <a:defRPr sz="2000" b="1"/>
+            </a:lvl2pPr>
+            <a:lvl3pPr marL="914400" indent="0">
+              <a:buNone/>
+              <a:defRPr sz="1800" b="1"/>
+            </a:lvl3pPr>
+            <a:lvl4pPr marL="1371600" indent="0">
+              <a:buNone/>
+              <a:defRPr sz="1600" b="1"/>
+            </a:lvl4pPr>
+            <a:lvl5pPr marL="1828800" indent="0">
+              <a:buNone/>
+              <a:defRPr sz="1600" b="1"/>
+            </a:lvl5pPr>
+            <a:lvl6pPr marL="2286000" indent="0">
+              <a:buNone/>
+              <a:defRPr sz="1600" b="1"/>
+            </a:lvl6pPr>
+            <a:lvl7pPr marL="2743200" indent="0">
+              <a:buNone/>
+              <a:defRPr sz="1600" b="1"/>
+            </a:lvl7pPr>
+            <a:lvl8pPr marL="3200400" indent="0">
+              <a:buNone/>
+              <a:defRPr sz="1600" b="1"/>
+            </a:lvl8pPr>
+            <a:lvl9pPr marL="3657600" indent="0">
+              <a:buNone/>
+              <a:defRPr sz="1600" b="1"/>
+            </a:lvl9pPr>
+          </a:lstStyle>
+          <a:p>
+            <a:pPr lvl="0"/>
+            <a:r>
+              <a:rPr lang="en-US"/>
+              <a:t>Click to edit Master text styles</a:t>
+            </a:r>
+          </a:p>
+        </p:txBody>
+      </p:sp>
+      <p:sp>
+        <p:nvSpPr>
+          <p:cNvPr id="6" name="Content Placeholder 5"/>
+          <p:cNvSpPr>
+            <a:spLocks noGrp="1"/>
+          </p:cNvSpPr>
+          <p:nvPr>
+            <p:ph sz="quarter" idx="4"/>
+          </p:nvPr>
+        </p:nvSpPr>
+        <p:spPr>
+          <a:xfrm>
+            <a:off x="6172200" y="2505075"/>
+            <a:ext cx="5183188" cy="3684588"/>
+          </a:xfrm>
+        </p:spPr>
+        <p:txBody>
+          <a:bodyPr/>
+          <a:lstStyle/>
+          <a:p>
+            <a:pPr lvl="0"/>
+            <a:r>
+              <a:rPr lang="en-US"/>
+              <a:t>Click to edit Master text styles</a:t>
+            </a:r>
+          </a:p>
+          <a:p>
+            <a:pPr lvl="1"/>
+            <a:r>
+              <a:rPr lang="en-US"/>
+              <a:t>Second level</a:t>
+            </a:r>
+          </a:p>
+          <a:p>
+            <a:pPr lvl="2"/>
+            <a:r>
+              <a:rPr lang="en-US"/>
+              <a:t>Third level</a:t>
+            </a:r>
+          </a:p>
+          <a:p>
+            <a:pPr lvl="3"/>
+            <a:r>
+              <a:rPr lang="en-US"/>
+              <a:t>Fourth level</a:t>
+            </a:r>
+          </a:p>
+          <a:p>
+            <a:pPr lvl="4"/>
+            <a:r>
+              <a:rPr lang="en-US"/>
+              <a:t>Fifth level</a:t>
+            </a:r>
+            <a:endParaRPr lang="en-US" dirty="0"/>
+          </a:p>
+        </p:txBody>
+      </p:sp>
+      <p:sp>
+        <p:nvSpPr>
+          <p:cNvPr id="7" name="Date Placeholder 6"/>
+          <p:cNvSpPr>
+            <a:spLocks noGrp="1"/>
+          </p:cNvSpPr>
+          <p:nvPr>
+            <p:ph type="dt" sz="half" idx="10"/>
+          </p:nvPr>
+        </p:nvSpPr>
+        <p:spPr/>
+        <p:txBody>
+          <a:bodyPr/>
+          <a:lstStyle/>
+          <a:p>
+            <a:fld id="{30450916-ED6A-46E3-AB56-D21E556239AF}" type="datetimeFigureOut">
+              <a:rPr lang="en-US" smtClean="0"/>
+              <a:t>5/15/2022</a:t>
+            </a:fld>
+            <a:endParaRPr lang="en-US"/>
+          </a:p>
+        </p:txBody>
+      </p:sp>
+      <p:sp>
+        <p:nvSpPr>
+          <p:cNvPr id="8" name="Footer Placeholder 7"/>
+          <p:cNvSpPr>
+            <a:spLocks noGrp="1"/>
+          </p:cNvSpPr>
+          <p:nvPr>
+            <p:ph type="ftr" sz="quarter" idx="11"/>
+          </p:nvPr>
+        </p:nvSpPr>
+        <p:spPr/>
+        <p:txBody>
+          <a:bodyPr/>
+          <a:lstStyle/>
+          <a:p>
+            <a:endParaRPr lang="en-US"/>
+          </a:p>
+        </p:txBody>
+      </p:sp>
+      <p:sp>
+        <p:nvSpPr>
+          <p:cNvPr id="9" name="Slide Number Placeholder 8"/>
+          <p:cNvSpPr>
+            <a:spLocks noGrp="1"/>
+          </p:cNvSpPr>
+          <p:nvPr>
+            <p:ph type="sldNum" sz="quarter" idx="12"/>
+          </p:nvPr>
+        </p:nvSpPr>
+        <p:spPr/>
+        <p:txBody>
+          <a:bodyPr/>
+          <a:lstStyle/>
+          <a:p>
+            <a:fld id="{E156977E-2058-4299-9B2D-03C8D32EE68A}" type="slidenum">
+              <a:rPr lang="en-US" smtClean="0"/>
+              <a:t>‹#›</a:t>
+            </a:fld>
+            <a:endParaRPr lang="en-US"/>
+          </a:p>
+        </p:txBody>
+      </p:sp>
+    </p:spTree>
+    <p:extLst>
+      <p:ext uri="{BB962C8B-B14F-4D97-AF65-F5344CB8AC3E}">
+        <p14:creationId xmlns:p14="http://schemas.microsoft.com/office/powerpoint/2010/main" val="3323544903"/>
+      </p:ext>
+    </p:extLst>
+  </p:cSld>
+  <p:clrMapOvr>
+    <a:masterClrMapping/>
+  </p:clrMapOvr>
+</p:sldLayout>
+</file>
+
+<file path=ppt/slideLayouts/slideLayout6.xml><?xml version="1.0" encoding="utf-8"?>
+<p:sldLayout xmlns:a="http://schemas.openxmlformats.org/drawingml/2006/main" xmlns:r="http://schemas.openxmlformats.org/officeDocument/2006/relationships" xmlns:p="http://schemas.openxmlformats.org/presentationml/2006/main" type="titleOnly" preserve="1">
+  <p:cSld name="Title Only">
+    <p:spTree>
+      <p:nvGrpSpPr>
+        <p:cNvPr id="1" name=""/>
+        <p:cNvGrpSpPr/>
+        <p:nvPr/>
+      </p:nvGrpSpPr>
+      <p:grpSpPr>
+        <a:xfrm>
+          <a:off x="0" y="0"/>
+          <a:ext cx="0" cy="0"/>
+          <a:chOff x="0" y="0"/>
+          <a:chExt cx="0" cy="0"/>
+        </a:xfrm>
+      </p:grpSpPr>
+      <p:sp>
+        <p:nvSpPr>
+          <p:cNvPr id="2" name="Title 1"/>
+          <p:cNvSpPr>
+            <a:spLocks noGrp="1"/>
+          </p:cNvSpPr>
+          <p:nvPr>
+            <p:ph type="title"/>
+          </p:nvPr>
+        </p:nvSpPr>
+        <p:spPr/>
+        <p:txBody>
+          <a:bodyPr/>
+          <a:lstStyle/>
+          <a:p>
+            <a:r>
+              <a:rPr lang="en-US"/>
+              <a:t>Click to edit Master title style</a:t>
+            </a:r>
+            <a:endParaRPr lang="en-US" dirty="0"/>
+          </a:p>
+        </p:txBody>
+      </p:sp>
+      <p:sp>
+        <p:nvSpPr>
+          <p:cNvPr id="3" name="Date Placeholder 2"/>
+          <p:cNvSpPr>
+            <a:spLocks noGrp="1"/>
+          </p:cNvSpPr>
+          <p:nvPr>
+            <p:ph type="dt" sz="half" idx="10"/>
+          </p:nvPr>
+        </p:nvSpPr>
+        <p:spPr/>
+        <p:txBody>
+          <a:bodyPr/>
+          <a:lstStyle/>
+          <a:p>
+            <a:fld id="{30450916-ED6A-46E3-AB56-D21E556239AF}" type="datetimeFigureOut">
+              <a:rPr lang="en-US" smtClean="0"/>
+              <a:t>5/15/2022</a:t>
+            </a:fld>
+            <a:endParaRPr lang="en-US"/>
+          </a:p>
+        </p:txBody>
+      </p:sp>
+      <p:sp>
+        <p:nvSpPr>
+          <p:cNvPr id="4" name="Footer Placeholder 3"/>
+          <p:cNvSpPr>
+            <a:spLocks noGrp="1"/>
+          </p:cNvSpPr>
+          <p:nvPr>
+            <p:ph type="ftr" sz="quarter" idx="11"/>
+          </p:nvPr>
+        </p:nvSpPr>
+        <p:spPr/>
+        <p:txBody>
+          <a:bodyPr/>
+          <a:lstStyle/>
+          <a:p>
+            <a:endParaRPr lang="en-US"/>
+          </a:p>
+        </p:txBody>
+      </p:sp>
+      <p:sp>
+        <p:nvSpPr>
+          <p:cNvPr id="5" name="Slide Number Placeholder 4"/>
+          <p:cNvSpPr>
+            <a:spLocks noGrp="1"/>
+          </p:cNvSpPr>
+          <p:nvPr>
+            <p:ph type="sldNum" sz="quarter" idx="12"/>
+          </p:nvPr>
+        </p:nvSpPr>
+        <p:spPr/>
+        <p:txBody>
+          <a:bodyPr/>
+          <a:lstStyle/>
+          <a:p>
+            <a:fld id="{E156977E-2058-4299-9B2D-03C8D32EE68A}" type="slidenum">
+              <a:rPr lang="en-US" smtClean="0"/>
+              <a:t>‹#›</a:t>
+            </a:fld>
+            <a:endParaRPr lang="en-US"/>
+          </a:p>
+        </p:txBody>
+      </p:sp>
+    </p:spTree>
+    <p:extLst>
+      <p:ext uri="{BB962C8B-B14F-4D97-AF65-F5344CB8AC3E}">
+        <p14:creationId xmlns:p14="http://schemas.microsoft.com/office/powerpoint/2010/main" val="3487868716"/>
+      </p:ext>
+    </p:extLst>
+  </p:cSld>
+  <p:clrMapOvr>
+    <a:masterClrMapping/>
+  </p:clrMapOvr>
+</p:sldLayout>
+</file>
+
+<file path=ppt/slideLayouts/slideLayout7.xml><?xml version="1.0" encoding="utf-8"?>
+<p:sldLayout xmlns:a="http://schemas.openxmlformats.org/drawingml/2006/main" xmlns:r="http://schemas.openxmlformats.org/officeDocument/2006/relationships" xmlns:p="http://schemas.openxmlformats.org/presentationml/2006/main" type="blank" preserve="1">
+  <p:cSld name="Blank">
+    <p:spTree>
+      <p:nvGrpSpPr>
+        <p:cNvPr id="1" name=""/>
+        <p:cNvGrpSpPr/>
+        <p:nvPr/>
+      </p:nvGrpSpPr>
+      <p:grpSpPr>
+        <a:xfrm>
+          <a:off x="0" y="0"/>
+          <a:ext cx="0" cy="0"/>
+          <a:chOff x="0" y="0"/>
+          <a:chExt cx="0" cy="0"/>
+        </a:xfrm>
+      </p:grpSpPr>
+      <p:sp>
+        <p:nvSpPr>
+          <p:cNvPr id="2" name="Date Placeholder 1"/>
+          <p:cNvSpPr>
+            <a:spLocks noGrp="1"/>
+          </p:cNvSpPr>
+          <p:nvPr>
+            <p:ph type="dt" sz="half" idx="10"/>
+          </p:nvPr>
+        </p:nvSpPr>
+        <p:spPr/>
+        <p:txBody>
+          <a:bodyPr/>
+          <a:lstStyle/>
+          <a:p>
+            <a:fld id="{30450916-ED6A-46E3-AB56-D21E556239AF}" type="datetimeFigureOut">
+              <a:rPr lang="en-US" smtClean="0"/>
+              <a:t>5/15/2022</a:t>
+            </a:fld>
+            <a:endParaRPr lang="en-US"/>
+          </a:p>
+        </p:txBody>
+      </p:sp>
+      <p:sp>
+        <p:nvSpPr>
+          <p:cNvPr id="3" name="Footer Placeholder 2"/>
+          <p:cNvSpPr>
+            <a:spLocks noGrp="1"/>
+          </p:cNvSpPr>
+          <p:nvPr>
+            <p:ph type="ftr" sz="quarter" idx="11"/>
+          </p:nvPr>
+        </p:nvSpPr>
+        <p:spPr/>
+        <p:txBody>
+          <a:bodyPr/>
+          <a:lstStyle/>
+          <a:p>
+            <a:endParaRPr lang="en-US"/>
+          </a:p>
+        </p:txBody>
+      </p:sp>
+      <p:sp>
+        <p:nvSpPr>
+          <p:cNvPr id="4" name="Slide Number Placeholder 3"/>
+          <p:cNvSpPr>
+            <a:spLocks noGrp="1"/>
+          </p:cNvSpPr>
+          <p:nvPr>
+            <p:ph type="sldNum" sz="quarter" idx="12"/>
+          </p:nvPr>
+        </p:nvSpPr>
+        <p:spPr/>
+        <p:txBody>
+          <a:bodyPr/>
+          <a:lstStyle/>
+          <a:p>
+            <a:fld id="{E156977E-2058-4299-9B2D-03C8D32EE68A}" type="slidenum">
+              <a:rPr lang="en-US" smtClean="0"/>
+              <a:t>‹#›</a:t>
+            </a:fld>
+            <a:endParaRPr lang="en-US"/>
+          </a:p>
+        </p:txBody>
+      </p:sp>
+      <p:pic>
+        <p:nvPicPr>
+          <p:cNvPr id="5" name="Picture 4">
+            <a:extLst>
+              <a:ext uri="{FF2B5EF4-FFF2-40B4-BE49-F238E27FC236}">
+                <a16:creationId xmlns:a16="http://schemas.microsoft.com/office/drawing/2014/main" id="{650DF4A6-4759-CC63-BA4A-1B4422943B19}"/>
+              </a:ext>
+            </a:extLst>
+          </p:cNvPr>
+          <p:cNvPicPr>
+            <a:picLocks noChangeAspect="1"/>
+          </p:cNvPicPr>
+          <p:nvPr userDrawn="1"/>
+        </p:nvPicPr>
+        <p:blipFill>
+          <a:blip r:embed="rId2"/>
+          <a:stretch>
+            <a:fillRect/>
+          </a:stretch>
+        </p:blipFill>
+        <p:spPr>
+          <a:xfrm>
+            <a:off x="0" y="0"/>
+            <a:ext cx="12193821" cy="6858000"/>
+          </a:xfrm>
+          <a:prstGeom prst="rect">
+            <a:avLst/>
+          </a:prstGeom>
+        </p:spPr>
+      </p:pic>
+    </p:spTree>
+    <p:extLst>
+      <p:ext uri="{BB962C8B-B14F-4D97-AF65-F5344CB8AC3E}">
+        <p14:creationId xmlns:p14="http://schemas.microsoft.com/office/powerpoint/2010/main" val="740061933"/>
+      </p:ext>
+    </p:extLst>
+  </p:cSld>
+  <p:clrMapOvr>
+    <a:masterClrMapping/>
+  </p:clrMapOvr>
+</p:sldLayout>
+</file>
+
 <file path=ppt/slideLayouts/slideLayout8.xml><?xml version="1.0" encoding="utf-8"?>
 <p:sldLayout xmlns:a="http://schemas.openxmlformats.org/drawingml/2006/main" xmlns:r="http://schemas.openxmlformats.org/officeDocument/2006/relationships" xmlns:p="http://schemas.openxmlformats.org/presentationml/2006/main" type="objTx" preserve="1">
   <p:cSld name="Content with Caption">
@@ -2195,13 +2078,7 @@
       </p:grpSpPr>
       <p:sp>
         <p:nvSpPr>
-          <p:cNvPr id="2" name="Title 1">
-            <a:extLst>
-              <a:ext uri="{FF2B5EF4-FFF2-40B4-BE49-F238E27FC236}">
-                <a16:creationId xmlns:a16="http://schemas.microsoft.com/office/drawing/2014/main" id="{82B2449E-8C73-4918-94BC-C56599A2E517}"/>
-              </a:ext>
-            </a:extLst>
-          </p:cNvPr>
+          <p:cNvPr id="2" name="Title 1"/>
           <p:cNvSpPr>
             <a:spLocks noGrp="1"/>
           </p:cNvSpPr>
@@ -2227,18 +2104,13 @@
               <a:rPr lang="en-US"/>
               <a:t>Click to edit Master title style</a:t>
             </a:r>
-          </a:p>
-        </p:txBody>
-      </p:sp>
-      <p:sp>
-        <p:nvSpPr>
-          <p:cNvPr id="3" name="Content Placeholder 2">
-            <a:extLst>
-              <a:ext uri="{FF2B5EF4-FFF2-40B4-BE49-F238E27FC236}">
-                <a16:creationId xmlns:a16="http://schemas.microsoft.com/office/drawing/2014/main" id="{4E8838B6-60EE-4542-8695-AF1164B4AC78}"/>
-              </a:ext>
-            </a:extLst>
-          </p:cNvPr>
+            <a:endParaRPr lang="en-US" dirty="0"/>
+          </a:p>
+        </p:txBody>
+      </p:sp>
+      <p:sp>
+        <p:nvSpPr>
+          <p:cNvPr id="3" name="Content Placeholder 2"/>
           <p:cNvSpPr>
             <a:spLocks noGrp="1"/>
           </p:cNvSpPr>
@@ -2317,18 +2189,13 @@
               <a:rPr lang="en-US"/>
               <a:t>Fifth level</a:t>
             </a:r>
-          </a:p>
-        </p:txBody>
-      </p:sp>
-      <p:sp>
-        <p:nvSpPr>
-          <p:cNvPr id="4" name="Text Placeholder 3">
-            <a:extLst>
-              <a:ext uri="{FF2B5EF4-FFF2-40B4-BE49-F238E27FC236}">
-                <a16:creationId xmlns:a16="http://schemas.microsoft.com/office/drawing/2014/main" id="{7780A6E2-6F79-4B56-80C4-92CF82229308}"/>
-              </a:ext>
-            </a:extLst>
-          </p:cNvPr>
+            <a:endParaRPr lang="en-US" dirty="0"/>
+          </a:p>
+        </p:txBody>
+      </p:sp>
+      <p:sp>
+        <p:nvSpPr>
+          <p:cNvPr id="4" name="Text Placeholder 3"/>
           <p:cNvSpPr>
             <a:spLocks noGrp="1"/>
           </p:cNvSpPr>
@@ -2393,13 +2260,7 @@
       </p:sp>
       <p:sp>
         <p:nvSpPr>
-          <p:cNvPr id="5" name="Date Placeholder 4">
-            <a:extLst>
-              <a:ext uri="{FF2B5EF4-FFF2-40B4-BE49-F238E27FC236}">
-                <a16:creationId xmlns:a16="http://schemas.microsoft.com/office/drawing/2014/main" id="{46DEC80D-9D4E-41CA-A5C6-D66464E32BC6}"/>
-              </a:ext>
-            </a:extLst>
-          </p:cNvPr>
+          <p:cNvPr id="5" name="Date Placeholder 4"/>
           <p:cNvSpPr>
             <a:spLocks noGrp="1"/>
           </p:cNvSpPr>
@@ -2414,7 +2275,7 @@
           <a:p>
             <a:fld id="{30450916-ED6A-46E3-AB56-D21E556239AF}" type="datetimeFigureOut">
               <a:rPr lang="en-US" smtClean="0"/>
-              <a:t>3/17/2022</a:t>
+              <a:t>5/15/2022</a:t>
             </a:fld>
             <a:endParaRPr lang="en-US"/>
           </a:p>
@@ -2422,13 +2283,7 @@
       </p:sp>
       <p:sp>
         <p:nvSpPr>
-          <p:cNvPr id="6" name="Footer Placeholder 5">
-            <a:extLst>
-              <a:ext uri="{FF2B5EF4-FFF2-40B4-BE49-F238E27FC236}">
-                <a16:creationId xmlns:a16="http://schemas.microsoft.com/office/drawing/2014/main" id="{258E3419-A5C5-4195-A298-0A637A047EA6}"/>
-              </a:ext>
-            </a:extLst>
-          </p:cNvPr>
+          <p:cNvPr id="6" name="Footer Placeholder 5"/>
           <p:cNvSpPr>
             <a:spLocks noGrp="1"/>
           </p:cNvSpPr>
@@ -2447,13 +2302,7 @@
       </p:sp>
       <p:sp>
         <p:nvSpPr>
-          <p:cNvPr id="7" name="Slide Number Placeholder 6">
-            <a:extLst>
-              <a:ext uri="{FF2B5EF4-FFF2-40B4-BE49-F238E27FC236}">
-                <a16:creationId xmlns:a16="http://schemas.microsoft.com/office/drawing/2014/main" id="{65573E53-8586-472E-A83F-22B082C99348}"/>
-              </a:ext>
-            </a:extLst>
-          </p:cNvPr>
+          <p:cNvPr id="7" name="Slide Number Placeholder 6"/>
           <p:cNvSpPr>
             <a:spLocks noGrp="1"/>
           </p:cNvSpPr>
@@ -2477,7 +2326,7 @@
     </p:spTree>
     <p:extLst>
       <p:ext uri="{BB962C8B-B14F-4D97-AF65-F5344CB8AC3E}">
-        <p14:creationId xmlns:p14="http://schemas.microsoft.com/office/powerpoint/2010/main" val="3818652579"/>
+        <p14:creationId xmlns:p14="http://schemas.microsoft.com/office/powerpoint/2010/main" val="319086327"/>
       </p:ext>
     </p:extLst>
   </p:cSld>
@@ -2506,13 +2355,7 @@
       </p:grpSpPr>
       <p:sp>
         <p:nvSpPr>
-          <p:cNvPr id="2" name="Title 1">
-            <a:extLst>
-              <a:ext uri="{FF2B5EF4-FFF2-40B4-BE49-F238E27FC236}">
-                <a16:creationId xmlns:a16="http://schemas.microsoft.com/office/drawing/2014/main" id="{14A98E66-7456-4047-B22D-A00B12D23760}"/>
-              </a:ext>
-            </a:extLst>
-          </p:cNvPr>
+          <p:cNvPr id="2" name="Title 1"/>
           <p:cNvSpPr>
             <a:spLocks noGrp="1"/>
           </p:cNvSpPr>
@@ -2538,20 +2381,15 @@
               <a:rPr lang="en-US"/>
               <a:t>Click to edit Master title style</a:t>
             </a:r>
-          </a:p>
-        </p:txBody>
-      </p:sp>
-      <p:sp>
-        <p:nvSpPr>
-          <p:cNvPr id="3" name="Picture Placeholder 2">
-            <a:extLst>
-              <a:ext uri="{FF2B5EF4-FFF2-40B4-BE49-F238E27FC236}">
-                <a16:creationId xmlns:a16="http://schemas.microsoft.com/office/drawing/2014/main" id="{C194351C-7C8B-4C5F-8BCE-E578A7471887}"/>
-              </a:ext>
-            </a:extLst>
-          </p:cNvPr>
-          <p:cNvSpPr>
-            <a:spLocks noGrp="1"/>
+            <a:endParaRPr lang="en-US" dirty="0"/>
+          </a:p>
+        </p:txBody>
+      </p:sp>
+      <p:sp>
+        <p:nvSpPr>
+          <p:cNvPr id="3" name="Picture Placeholder 2"/>
+          <p:cNvSpPr>
+            <a:spLocks noGrp="1" noChangeAspect="1"/>
           </p:cNvSpPr>
           <p:nvPr>
             <p:ph type="pic" idx="1"/>
@@ -2564,7 +2402,7 @@
           </a:xfrm>
         </p:spPr>
         <p:txBody>
-          <a:bodyPr/>
+          <a:bodyPr anchor="t"/>
           <a:lstStyle>
             <a:lvl1pPr marL="0" indent="0">
               <a:buNone/>
@@ -2604,19 +2442,17 @@
             </a:lvl9pPr>
           </a:lstStyle>
           <a:p>
-            <a:endParaRPr lang="en-US"/>
-          </a:p>
-        </p:txBody>
-      </p:sp>
-      <p:sp>
-        <p:nvSpPr>
-          <p:cNvPr id="4" name="Text Placeholder 3">
-            <a:extLst>
-              <a:ext uri="{FF2B5EF4-FFF2-40B4-BE49-F238E27FC236}">
-                <a16:creationId xmlns:a16="http://schemas.microsoft.com/office/drawing/2014/main" id="{F6CB39CD-4AE1-4268-B5ED-46E4E9624CD3}"/>
-              </a:ext>
-            </a:extLst>
-          </p:cNvPr>
+            <a:r>
+              <a:rPr lang="en-US"/>
+              <a:t>Click icon to add picture</a:t>
+            </a:r>
+            <a:endParaRPr lang="en-US" dirty="0"/>
+          </a:p>
+        </p:txBody>
+      </p:sp>
+      <p:sp>
+        <p:nvSpPr>
+          <p:cNvPr id="4" name="Text Placeholder 3"/>
           <p:cNvSpPr>
             <a:spLocks noGrp="1"/>
           </p:cNvSpPr>
@@ -2681,13 +2517,7 @@
       </p:sp>
       <p:sp>
         <p:nvSpPr>
-          <p:cNvPr id="5" name="Date Placeholder 4">
-            <a:extLst>
-              <a:ext uri="{FF2B5EF4-FFF2-40B4-BE49-F238E27FC236}">
-                <a16:creationId xmlns:a16="http://schemas.microsoft.com/office/drawing/2014/main" id="{9340A1BB-5B1E-41FC-AA72-91556E0BC372}"/>
-              </a:ext>
-            </a:extLst>
-          </p:cNvPr>
+          <p:cNvPr id="5" name="Date Placeholder 4"/>
           <p:cNvSpPr>
             <a:spLocks noGrp="1"/>
           </p:cNvSpPr>
@@ -2702,7 +2532,7 @@
           <a:p>
             <a:fld id="{30450916-ED6A-46E3-AB56-D21E556239AF}" type="datetimeFigureOut">
               <a:rPr lang="en-US" smtClean="0"/>
-              <a:t>3/17/2022</a:t>
+              <a:t>5/15/2022</a:t>
             </a:fld>
             <a:endParaRPr lang="en-US"/>
           </a:p>
@@ -2710,13 +2540,7 @@
       </p:sp>
       <p:sp>
         <p:nvSpPr>
-          <p:cNvPr id="6" name="Footer Placeholder 5">
-            <a:extLst>
-              <a:ext uri="{FF2B5EF4-FFF2-40B4-BE49-F238E27FC236}">
-                <a16:creationId xmlns:a16="http://schemas.microsoft.com/office/drawing/2014/main" id="{6E602D6A-A82A-4EC2-AC2A-429A70D2678E}"/>
-              </a:ext>
-            </a:extLst>
-          </p:cNvPr>
+          <p:cNvPr id="6" name="Footer Placeholder 5"/>
           <p:cNvSpPr>
             <a:spLocks noGrp="1"/>
           </p:cNvSpPr>
@@ -2735,13 +2559,7 @@
       </p:sp>
       <p:sp>
         <p:nvSpPr>
-          <p:cNvPr id="7" name="Slide Number Placeholder 6">
-            <a:extLst>
-              <a:ext uri="{FF2B5EF4-FFF2-40B4-BE49-F238E27FC236}">
-                <a16:creationId xmlns:a16="http://schemas.microsoft.com/office/drawing/2014/main" id="{3B0D6FEF-A5FA-49E4-AFD9-591F1D680ABE}"/>
-              </a:ext>
-            </a:extLst>
-          </p:cNvPr>
+          <p:cNvPr id="7" name="Slide Number Placeholder 6"/>
           <p:cNvSpPr>
             <a:spLocks noGrp="1"/>
           </p:cNvSpPr>
@@ -2765,7 +2583,7 @@
     </p:spTree>
     <p:extLst>
       <p:ext uri="{BB962C8B-B14F-4D97-AF65-F5344CB8AC3E}">
-        <p14:creationId xmlns:p14="http://schemas.microsoft.com/office/powerpoint/2010/main" val="2522710137"/>
+        <p14:creationId xmlns:p14="http://schemas.microsoft.com/office/powerpoint/2010/main" val="3041800940"/>
       </p:ext>
     </p:extLst>
   </p:cSld>
@@ -2799,13 +2617,7 @@
       </p:grpSpPr>
       <p:sp>
         <p:nvSpPr>
-          <p:cNvPr id="2" name="Title Placeholder 1">
-            <a:extLst>
-              <a:ext uri="{FF2B5EF4-FFF2-40B4-BE49-F238E27FC236}">
-                <a16:creationId xmlns:a16="http://schemas.microsoft.com/office/drawing/2014/main" id="{33378333-6E45-40F3-A370-A0380C4FB70A}"/>
-              </a:ext>
-            </a:extLst>
-          </p:cNvPr>
+          <p:cNvPr id="2" name="Title Placeholder 1"/>
           <p:cNvSpPr>
             <a:spLocks noGrp="1"/>
           </p:cNvSpPr>
@@ -2832,18 +2644,13 @@
               <a:rPr lang="en-US"/>
               <a:t>Click to edit Master title style</a:t>
             </a:r>
-          </a:p>
-        </p:txBody>
-      </p:sp>
-      <p:sp>
-        <p:nvSpPr>
-          <p:cNvPr id="3" name="Text Placeholder 2">
-            <a:extLst>
-              <a:ext uri="{FF2B5EF4-FFF2-40B4-BE49-F238E27FC236}">
-                <a16:creationId xmlns:a16="http://schemas.microsoft.com/office/drawing/2014/main" id="{61780D1B-3672-477D-9FDF-D7E21DDC4D02}"/>
-              </a:ext>
-            </a:extLst>
-          </p:cNvPr>
+            <a:endParaRPr lang="en-US" dirty="0"/>
+          </a:p>
+        </p:txBody>
+      </p:sp>
+      <p:sp>
+        <p:nvSpPr>
+          <p:cNvPr id="3" name="Text Placeholder 2"/>
           <p:cNvSpPr>
             <a:spLocks noGrp="1"/>
           </p:cNvSpPr>
@@ -2899,18 +2706,13 @@
               <a:rPr lang="en-US"/>
               <a:t>Fifth level</a:t>
             </a:r>
-          </a:p>
-        </p:txBody>
-      </p:sp>
-      <p:sp>
-        <p:nvSpPr>
-          <p:cNvPr id="4" name="Date Placeholder 3">
-            <a:extLst>
-              <a:ext uri="{FF2B5EF4-FFF2-40B4-BE49-F238E27FC236}">
-                <a16:creationId xmlns:a16="http://schemas.microsoft.com/office/drawing/2014/main" id="{AB43896B-19EA-4C98-B903-B978828D2011}"/>
-              </a:ext>
-            </a:extLst>
-          </p:cNvPr>
+            <a:endParaRPr lang="en-US" dirty="0"/>
+          </a:p>
+        </p:txBody>
+      </p:sp>
+      <p:sp>
+        <p:nvSpPr>
+          <p:cNvPr id="4" name="Date Placeholder 3"/>
           <p:cNvSpPr>
             <a:spLocks noGrp="1"/>
           </p:cNvSpPr>
@@ -2943,7 +2745,7 @@
           <a:p>
             <a:fld id="{30450916-ED6A-46E3-AB56-D21E556239AF}" type="datetimeFigureOut">
               <a:rPr lang="en-US" smtClean="0"/>
-              <a:t>3/17/2022</a:t>
+              <a:t>5/15/2022</a:t>
             </a:fld>
             <a:endParaRPr lang="en-US"/>
           </a:p>
@@ -2951,13 +2753,7 @@
       </p:sp>
       <p:sp>
         <p:nvSpPr>
-          <p:cNvPr id="5" name="Footer Placeholder 4">
-            <a:extLst>
-              <a:ext uri="{FF2B5EF4-FFF2-40B4-BE49-F238E27FC236}">
-                <a16:creationId xmlns:a16="http://schemas.microsoft.com/office/drawing/2014/main" id="{2366381B-75C4-4753-B740-52A8B56A785A}"/>
-              </a:ext>
-            </a:extLst>
-          </p:cNvPr>
+          <p:cNvPr id="5" name="Footer Placeholder 4"/>
           <p:cNvSpPr>
             <a:spLocks noGrp="1"/>
           </p:cNvSpPr>
@@ -2994,13 +2790,7 @@
       </p:sp>
       <p:sp>
         <p:nvSpPr>
-          <p:cNvPr id="6" name="Slide Number Placeholder 5">
-            <a:extLst>
-              <a:ext uri="{FF2B5EF4-FFF2-40B4-BE49-F238E27FC236}">
-                <a16:creationId xmlns:a16="http://schemas.microsoft.com/office/drawing/2014/main" id="{744B370E-36D1-4ADB-9CDC-1063E7393A1A}"/>
-              </a:ext>
-            </a:extLst>
-          </p:cNvPr>
+          <p:cNvPr id="6" name="Slide Number Placeholder 5"/>
           <p:cNvSpPr>
             <a:spLocks noGrp="1"/>
           </p:cNvSpPr>
@@ -3042,23 +2832,24 @@
     </p:spTree>
     <p:extLst>
       <p:ext uri="{BB962C8B-B14F-4D97-AF65-F5344CB8AC3E}">
-        <p14:creationId xmlns:p14="http://schemas.microsoft.com/office/powerpoint/2010/main" val="3916031244"/>
+        <p14:creationId xmlns:p14="http://schemas.microsoft.com/office/powerpoint/2010/main" val="3703950985"/>
       </p:ext>
     </p:extLst>
   </p:cSld>
-  <p:clrMap bg1="lt1" tx1="dk1" bg2="lt2" tx2="dk2" accent1="accent1" accent2="accent2" accent3="accent3" accent4="accent4" accent5="accent5" accent6="accent6" hlink="hlink" folHlink="folHlink"/>
+  <p:clrMap bg1="dk1" tx1="lt1" bg2="dk2" tx2="lt2" accent1="accent1" accent2="accent2" accent3="accent3" accent4="accent4" accent5="accent5" accent6="accent6" hlink="hlink" folHlink="folHlink"/>
   <p:sldLayoutIdLst>
-    <p:sldLayoutId id="2147483649" r:id="rId1"/>
-    <p:sldLayoutId id="2147483650" r:id="rId2"/>
-    <p:sldLayoutId id="2147483651" r:id="rId3"/>
-    <p:sldLayoutId id="2147483652" r:id="rId4"/>
-    <p:sldLayoutId id="2147483653" r:id="rId5"/>
-    <p:sldLayoutId id="2147483654" r:id="rId6"/>
-    <p:sldLayoutId id="2147483655" r:id="rId7"/>
-    <p:sldLayoutId id="2147483656" r:id="rId8"/>
-    <p:sldLayoutId id="2147483657" r:id="rId9"/>
-    <p:sldLayoutId id="2147483658" r:id="rId10"/>
-    <p:sldLayoutId id="2147483659" r:id="rId11"/>
+    <p:sldLayoutId id="2147483661" r:id="rId1"/>
+    <p:sldLayoutId id="2147483662" r:id="rId2"/>
+    <p:sldLayoutId id="2147483663" r:id="rId3"/>
+    <p:sldLayoutId id="2147483664" r:id="rId4"/>
+    <p:sldLayoutId id="2147483665" r:id="rId5"/>
+    <p:sldLayoutId id="2147483666" r:id="rId6"/>
+    <p:sldLayoutId id="2147483667" r:id="rId7"/>
+    <p:sldLayoutId id="2147483668" r:id="rId8"/>
+    <p:sldLayoutId id="2147483669" r:id="rId9"/>
+    <p:sldLayoutId id="2147483670" r:id="rId10"/>
+    <p:sldLayoutId id="2147483671" r:id="rId11"/>
+    <p:sldLayoutId id="2147483655" r:id="rId12"/>
   </p:sldLayoutIdLst>
   <p:txStyles>
     <p:titleStyle>
@@ -3816,7 +3607,7 @@
 <file path=ppt/theme/theme1.xml><?xml version="1.0" encoding="utf-8"?>
 <a:theme xmlns:a="http://schemas.openxmlformats.org/drawingml/2006/main" name="Office Theme">
   <a:themeElements>
-    <a:clrScheme name="Office">
+    <a:clrScheme name="Office Theme">
       <a:dk1>
         <a:sysClr val="windowText" lastClr="000000"/>
       </a:dk1>
@@ -3854,7 +3645,7 @@
         <a:srgbClr val="954F72"/>
       </a:folHlink>
     </a:clrScheme>
-    <a:fontScheme name="Office">
+    <a:fontScheme name="Office Theme">
       <a:majorFont>
         <a:latin typeface="Calibri Light" panose="020F0302020204030204"/>
         <a:ea typeface=""/>
@@ -3889,23 +3680,6 @@
         <a:font script="Viet" typeface="Times New Roman"/>
         <a:font script="Uigh" typeface="Microsoft Uighur"/>
         <a:font script="Geor" typeface="Sylfaen"/>
-        <a:font script="Armn" typeface="Arial"/>
-        <a:font script="Bugi" typeface="Leelawadee UI"/>
-        <a:font script="Bopo" typeface="Microsoft JhengHei"/>
-        <a:font script="Java" typeface="Javanese Text"/>
-        <a:font script="Lisu" typeface="Segoe UI"/>
-        <a:font script="Mymr" typeface="Myanmar Text"/>
-        <a:font script="Nkoo" typeface="Ebrima"/>
-        <a:font script="Olck" typeface="Nirmala UI"/>
-        <a:font script="Osma" typeface="Ebrima"/>
-        <a:font script="Phag" typeface="Phagspa"/>
-        <a:font script="Syrn" typeface="Estrangelo Edessa"/>
-        <a:font script="Syrj" typeface="Estrangelo Edessa"/>
-        <a:font script="Syre" typeface="Estrangelo Edessa"/>
-        <a:font script="Sora" typeface="Nirmala UI"/>
-        <a:font script="Tale" typeface="Microsoft Tai Le"/>
-        <a:font script="Talu" typeface="Microsoft New Tai Lue"/>
-        <a:font script="Tfng" typeface="Ebrima"/>
       </a:majorFont>
       <a:minorFont>
         <a:latin typeface="Calibri" panose="020F0502020204030204"/>
@@ -3941,26 +3715,9 @@
         <a:font script="Viet" typeface="Arial"/>
         <a:font script="Uigh" typeface="Microsoft Uighur"/>
         <a:font script="Geor" typeface="Sylfaen"/>
-        <a:font script="Armn" typeface="Arial"/>
-        <a:font script="Bugi" typeface="Leelawadee UI"/>
-        <a:font script="Bopo" typeface="Microsoft JhengHei"/>
-        <a:font script="Java" typeface="Javanese Text"/>
-        <a:font script="Lisu" typeface="Segoe UI"/>
-        <a:font script="Mymr" typeface="Myanmar Text"/>
-        <a:font script="Nkoo" typeface="Ebrima"/>
-        <a:font script="Olck" typeface="Nirmala UI"/>
-        <a:font script="Osma" typeface="Ebrima"/>
-        <a:font script="Phag" typeface="Phagspa"/>
-        <a:font script="Syrn" typeface="Estrangelo Edessa"/>
-        <a:font script="Syrj" typeface="Estrangelo Edessa"/>
-        <a:font script="Syre" typeface="Estrangelo Edessa"/>
-        <a:font script="Sora" typeface="Nirmala UI"/>
-        <a:font script="Tale" typeface="Microsoft Tai Le"/>
-        <a:font script="Talu" typeface="Microsoft New Tai Lue"/>
-        <a:font script="Tfng" typeface="Ebrima"/>
       </a:minorFont>
     </a:fontScheme>
-    <a:fmtScheme name="Office">
+    <a:fmtScheme name="Office Theme">
       <a:fillStyleLst>
         <a:solidFill>
           <a:schemeClr val="phClr"/>
@@ -4102,7 +3859,7 @@
   <a:extraClrSchemeLst/>
   <a:extLst>
     <a:ext uri="{05A4C25C-085E-4340-85A3-A5531E510DB2}">
-      <thm15:themeFamily xmlns:thm15="http://schemas.microsoft.com/office/thememl/2012/main" name="Office Theme" id="{62F939B6-93AF-4DB8-9C6B-D6C7DFDC589F}" vid="{4A3C46E8-61CC-4603-A589-7422A47A8E4A}"/>
+      <thm15:themeFamily xmlns:thm15="http://schemas.microsoft.com/office/thememl/2012/main" name="Office Theme" id="{62F939B6-93AF-4DB8-9C6B-D6C7DFDC589F}" vid="{4F46216B-77A9-411A-B9D3-5023FCB70208}"/>
     </a:ext>
   </a:extLst>
 </a:theme>

</xml_diff>